<commit_message>
Add startGame, startRound, getGameState API
</commit_message>
<xml_diff>
--- a/doc/document.pptx
+++ b/doc/document.pptx
@@ -15,12 +15,13 @@
     <p:sldId id="263" r:id="rId9"/>
     <p:sldId id="270" r:id="rId10"/>
     <p:sldId id="272" r:id="rId11"/>
-    <p:sldId id="267" r:id="rId12"/>
-    <p:sldId id="271" r:id="rId13"/>
-    <p:sldId id="269" r:id="rId14"/>
-    <p:sldId id="273" r:id="rId15"/>
-    <p:sldId id="257" r:id="rId16"/>
-    <p:sldId id="274" r:id="rId17"/>
+    <p:sldId id="275" r:id="rId12"/>
+    <p:sldId id="267" r:id="rId13"/>
+    <p:sldId id="271" r:id="rId14"/>
+    <p:sldId id="269" r:id="rId15"/>
+    <p:sldId id="273" r:id="rId16"/>
+    <p:sldId id="257" r:id="rId17"/>
+    <p:sldId id="274" r:id="rId18"/>
   </p:sldIdLst>
   <p:sldSz cx="12192000" cy="6858000"/>
   <p:notesSz cx="6858000" cy="9144000"/>
@@ -274,7 +275,7 @@
           <a:p>
             <a:fld id="{29D7F5FF-29A7-4E18-B99B-DE968AE8E284}" type="datetimeFigureOut">
               <a:rPr lang="ko-KR" altLang="en-US" smtClean="0"/>
-              <a:t>2022-11-24</a:t>
+              <a:t>2022-12-04</a:t>
             </a:fld>
             <a:endParaRPr lang="ko-KR" altLang="en-US"/>
           </a:p>
@@ -472,7 +473,7 @@
           <a:p>
             <a:fld id="{29D7F5FF-29A7-4E18-B99B-DE968AE8E284}" type="datetimeFigureOut">
               <a:rPr lang="ko-KR" altLang="en-US" smtClean="0"/>
-              <a:t>2022-11-24</a:t>
+              <a:t>2022-12-04</a:t>
             </a:fld>
             <a:endParaRPr lang="ko-KR" altLang="en-US"/>
           </a:p>
@@ -680,7 +681,7 @@
           <a:p>
             <a:fld id="{29D7F5FF-29A7-4E18-B99B-DE968AE8E284}" type="datetimeFigureOut">
               <a:rPr lang="ko-KR" altLang="en-US" smtClean="0"/>
-              <a:t>2022-11-24</a:t>
+              <a:t>2022-12-04</a:t>
             </a:fld>
             <a:endParaRPr lang="ko-KR" altLang="en-US"/>
           </a:p>
@@ -878,7 +879,7 @@
           <a:p>
             <a:fld id="{29D7F5FF-29A7-4E18-B99B-DE968AE8E284}" type="datetimeFigureOut">
               <a:rPr lang="ko-KR" altLang="en-US" smtClean="0"/>
-              <a:t>2022-11-24</a:t>
+              <a:t>2022-12-04</a:t>
             </a:fld>
             <a:endParaRPr lang="ko-KR" altLang="en-US"/>
           </a:p>
@@ -1153,7 +1154,7 @@
           <a:p>
             <a:fld id="{29D7F5FF-29A7-4E18-B99B-DE968AE8E284}" type="datetimeFigureOut">
               <a:rPr lang="ko-KR" altLang="en-US" smtClean="0"/>
-              <a:t>2022-11-24</a:t>
+              <a:t>2022-12-04</a:t>
             </a:fld>
             <a:endParaRPr lang="ko-KR" altLang="en-US"/>
           </a:p>
@@ -1418,7 +1419,7 @@
           <a:p>
             <a:fld id="{29D7F5FF-29A7-4E18-B99B-DE968AE8E284}" type="datetimeFigureOut">
               <a:rPr lang="ko-KR" altLang="en-US" smtClean="0"/>
-              <a:t>2022-11-24</a:t>
+              <a:t>2022-12-04</a:t>
             </a:fld>
             <a:endParaRPr lang="ko-KR" altLang="en-US"/>
           </a:p>
@@ -1830,7 +1831,7 @@
           <a:p>
             <a:fld id="{29D7F5FF-29A7-4E18-B99B-DE968AE8E284}" type="datetimeFigureOut">
               <a:rPr lang="ko-KR" altLang="en-US" smtClean="0"/>
-              <a:t>2022-11-24</a:t>
+              <a:t>2022-12-04</a:t>
             </a:fld>
             <a:endParaRPr lang="ko-KR" altLang="en-US"/>
           </a:p>
@@ -1971,7 +1972,7 @@
           <a:p>
             <a:fld id="{29D7F5FF-29A7-4E18-B99B-DE968AE8E284}" type="datetimeFigureOut">
               <a:rPr lang="ko-KR" altLang="en-US" smtClean="0"/>
-              <a:t>2022-11-24</a:t>
+              <a:t>2022-12-04</a:t>
             </a:fld>
             <a:endParaRPr lang="ko-KR" altLang="en-US"/>
           </a:p>
@@ -2084,7 +2085,7 @@
           <a:p>
             <a:fld id="{29D7F5FF-29A7-4E18-B99B-DE968AE8E284}" type="datetimeFigureOut">
               <a:rPr lang="ko-KR" altLang="en-US" smtClean="0"/>
-              <a:t>2022-11-24</a:t>
+              <a:t>2022-12-04</a:t>
             </a:fld>
             <a:endParaRPr lang="ko-KR" altLang="en-US"/>
           </a:p>
@@ -2395,7 +2396,7 @@
           <a:p>
             <a:fld id="{29D7F5FF-29A7-4E18-B99B-DE968AE8E284}" type="datetimeFigureOut">
               <a:rPr lang="ko-KR" altLang="en-US" smtClean="0"/>
-              <a:t>2022-11-24</a:t>
+              <a:t>2022-12-04</a:t>
             </a:fld>
             <a:endParaRPr lang="ko-KR" altLang="en-US"/>
           </a:p>
@@ -2683,7 +2684,7 @@
           <a:p>
             <a:fld id="{29D7F5FF-29A7-4E18-B99B-DE968AE8E284}" type="datetimeFigureOut">
               <a:rPr lang="ko-KR" altLang="en-US" smtClean="0"/>
-              <a:t>2022-11-24</a:t>
+              <a:t>2022-12-04</a:t>
             </a:fld>
             <a:endParaRPr lang="ko-KR" altLang="en-US"/>
           </a:p>
@@ -2924,7 +2925,7 @@
           <a:p>
             <a:fld id="{29D7F5FF-29A7-4E18-B99B-DE968AE8E284}" type="datetimeFigureOut">
               <a:rPr lang="ko-KR" altLang="en-US" smtClean="0"/>
-              <a:t>2022-11-24</a:t>
+              <a:t>2022-12-04</a:t>
             </a:fld>
             <a:endParaRPr lang="ko-KR" altLang="en-US"/>
           </a:p>
@@ -3530,7 +3531,7 @@
         </p:nvSpPr>
         <p:spPr>
           <a:xfrm>
-            <a:off x="1317071" y="2551652"/>
+            <a:off x="4190884" y="2526331"/>
             <a:ext cx="1592510" cy="1466675"/>
           </a:xfrm>
           <a:prstGeom prst="rect">
@@ -3585,8 +3586,8 @@
         </p:nvCxnSpPr>
         <p:spPr>
           <a:xfrm flipH="1">
-            <a:off x="2113325" y="4018327"/>
-            <a:ext cx="1" cy="832604"/>
+            <a:off x="2113325" y="3993006"/>
+            <a:ext cx="2873814" cy="857925"/>
           </a:xfrm>
           <a:prstGeom prst="straightConnector1">
             <a:avLst/>
@@ -3628,9 +3629,9 @@
           <p:nvPr/>
         </p:nvCxnSpPr>
         <p:spPr>
-          <a:xfrm flipH="1">
-            <a:off x="2113326" y="1747707"/>
-            <a:ext cx="1800952" cy="803945"/>
+          <a:xfrm>
+            <a:off x="3914278" y="1747707"/>
+            <a:ext cx="1072861" cy="778624"/>
           </a:xfrm>
           <a:prstGeom prst="straightConnector1">
             <a:avLst/>
@@ -3667,10 +3668,16 @@
           <p:cNvGraphicFramePr>
             <a:graphicFrameLocks noGrp="1"/>
           </p:cNvGraphicFramePr>
-          <p:nvPr/>
+          <p:nvPr>
+            <p:extLst>
+              <p:ext uri="{D42A27DB-BD31-4B8C-83A1-F6EECF244321}">
+                <p14:modId xmlns:p14="http://schemas.microsoft.com/office/powerpoint/2010/main" val="3332398803"/>
+              </p:ext>
+            </p:extLst>
+          </p:nvPr>
         </p:nvGraphicFramePr>
         <p:xfrm>
-          <a:off x="1539614" y="2758229"/>
+          <a:off x="4413427" y="2732908"/>
           <a:ext cx="1147420" cy="1053520"/>
         </p:xfrm>
         <a:graphic>
@@ -4327,7 +4334,7 @@
         </p:nvSpPr>
         <p:spPr>
           <a:xfrm>
-            <a:off x="3706776" y="3122886"/>
+            <a:off x="1568980" y="3065322"/>
             <a:ext cx="1289808" cy="230832"/>
           </a:xfrm>
           <a:prstGeom prst="rect">
@@ -4371,9 +4378,9 @@
           <p:nvPr/>
         </p:nvCxnSpPr>
         <p:spPr>
-          <a:xfrm flipH="1">
-            <a:off x="4996584" y="3196903"/>
-            <a:ext cx="3222290" cy="41399"/>
+          <a:xfrm flipH="1" flipV="1">
+            <a:off x="2858788" y="3180738"/>
+            <a:ext cx="5360086" cy="16165"/>
           </a:xfrm>
           <a:prstGeom prst="straightConnector1">
             <a:avLst/>
@@ -4416,8 +4423,8 @@
         </p:nvCxnSpPr>
         <p:spPr>
           <a:xfrm flipV="1">
-            <a:off x="4996584" y="2526331"/>
-            <a:ext cx="1636541" cy="711971"/>
+            <a:off x="2858788" y="2526331"/>
+            <a:ext cx="3774337" cy="654407"/>
           </a:xfrm>
           <a:prstGeom prst="straightConnector1">
             <a:avLst/>
@@ -4454,14 +4461,14 @@
           <p:cNvCxnSpPr>
             <a:cxnSpLocks/>
             <a:stCxn id="2" idx="2"/>
-            <a:endCxn id="53" idx="1"/>
+            <a:endCxn id="53" idx="0"/>
           </p:cNvCxnSpPr>
           <p:nvPr/>
         </p:nvCxnSpPr>
         <p:spPr>
           <a:xfrm flipH="1">
-            <a:off x="3706776" y="1747707"/>
-            <a:ext cx="207502" cy="1490595"/>
+            <a:off x="2213884" y="1747707"/>
+            <a:ext cx="1700394" cy="1317615"/>
           </a:xfrm>
           <a:prstGeom prst="straightConnector1">
             <a:avLst/>
@@ -4500,15 +4507,15 @@
           </p:cNvPr>
           <p:cNvCxnSpPr>
             <a:cxnSpLocks/>
-            <a:stCxn id="53" idx="1"/>
+            <a:stCxn id="53" idx="2"/>
             <a:endCxn id="3" idx="0"/>
           </p:cNvCxnSpPr>
           <p:nvPr/>
         </p:nvCxnSpPr>
         <p:spPr>
           <a:xfrm flipH="1">
-            <a:off x="2113325" y="3238302"/>
-            <a:ext cx="1593451" cy="1612629"/>
+            <a:off x="2113325" y="3296154"/>
+            <a:ext cx="100559" cy="1554777"/>
           </a:xfrm>
           <a:prstGeom prst="straightConnector1">
             <a:avLst/>
@@ -4804,10 +4811,258 @@
       </p:grpSpPr>
       <p:sp>
         <p:nvSpPr>
-          <p:cNvPr id="5" name="제목 4">
-            <a:extLst>
-              <a:ext uri="{FF2B5EF4-FFF2-40B4-BE49-F238E27FC236}">
-                <a16:creationId xmlns:a16="http://schemas.microsoft.com/office/drawing/2014/main" id="{5C35C333-91A6-C986-A543-E94154679624}"/>
+          <p:cNvPr id="3" name="TextBox 2">
+            <a:extLst>
+              <a:ext uri="{FF2B5EF4-FFF2-40B4-BE49-F238E27FC236}">
+                <a16:creationId xmlns:a16="http://schemas.microsoft.com/office/drawing/2014/main" id="{CB4B80B6-3D89-4011-BD8A-CEE888CA3A6E}"/>
+              </a:ext>
+            </a:extLst>
+          </p:cNvPr>
+          <p:cNvSpPr txBox="1"/>
+          <p:nvPr/>
+        </p:nvSpPr>
+        <p:spPr>
+          <a:xfrm>
+            <a:off x="183857" y="880844"/>
+            <a:ext cx="11200003" cy="3139321"/>
+          </a:xfrm>
+          <a:prstGeom prst="rect">
+            <a:avLst/>
+          </a:prstGeom>
+          <a:noFill/>
+        </p:spPr>
+        <p:txBody>
+          <a:bodyPr wrap="square" rtlCol="0">
+            <a:spAutoFit/>
+          </a:bodyPr>
+          <a:lstStyle/>
+          <a:p>
+            <a:pPr marL="285750" indent="-285750">
+              <a:buFont typeface="Arial" panose="020B0604020202020204" pitchFamily="34" charset="0"/>
+              <a:buChar char="•"/>
+            </a:pPr>
+            <a:r>
+              <a:rPr lang="en-US" altLang="ko-KR"/>
+              <a:t>websocket </a:t>
+            </a:r>
+            <a:r>
+              <a:rPr lang="ko-KR" altLang="en-US"/>
+              <a:t>연결전 </a:t>
+            </a:r>
+            <a:r>
+              <a:rPr lang="en-US" altLang="ko-KR"/>
+              <a:t>http </a:t>
+            </a:r>
+            <a:r>
+              <a:rPr lang="ko-KR" altLang="en-US"/>
+              <a:t>통신을 통해 방에 접속할 수 있는지 확인</a:t>
+            </a:r>
+            <a:endParaRPr lang="en-US" altLang="ko-KR"/>
+          </a:p>
+          <a:p>
+            <a:pPr marL="285750" indent="-285750">
+              <a:buFont typeface="Arial" panose="020B0604020202020204" pitchFamily="34" charset="0"/>
+              <a:buChar char="•"/>
+            </a:pPr>
+            <a:r>
+              <a:rPr lang="ko-KR" altLang="en-US"/>
+              <a:t>방</a:t>
+            </a:r>
+            <a:r>
+              <a:rPr lang="en-US" altLang="ko-KR"/>
+              <a:t> </a:t>
+            </a:r>
+            <a:r>
+              <a:rPr lang="ko-KR" altLang="en-US"/>
+              <a:t>생성</a:t>
+            </a:r>
+            <a:endParaRPr lang="en-US" altLang="ko-KR"/>
+          </a:p>
+          <a:p>
+            <a:pPr marL="742950" lvl="1" indent="-285750">
+              <a:buFont typeface="Arial" panose="020B0604020202020204" pitchFamily="34" charset="0"/>
+              <a:buChar char="•"/>
+            </a:pPr>
+            <a:r>
+              <a:rPr lang="ko-KR" altLang="en-US"/>
+              <a:t>방장은 포스트 요청을 하여</a:t>
+            </a:r>
+            <a:r>
+              <a:rPr lang="en-US" altLang="ko-KR"/>
+              <a:t>, room id</a:t>
+            </a:r>
+            <a:r>
+              <a:rPr lang="ko-KR" altLang="en-US"/>
+              <a:t>와 토큰을 받는다</a:t>
+            </a:r>
+            <a:r>
+              <a:rPr lang="en-US" altLang="ko-KR"/>
+              <a:t>.</a:t>
+            </a:r>
+          </a:p>
+          <a:p>
+            <a:pPr marL="742950" lvl="1" indent="-285750">
+              <a:buFont typeface="Arial" panose="020B0604020202020204" pitchFamily="34" charset="0"/>
+              <a:buChar char="•"/>
+            </a:pPr>
+            <a:r>
+              <a:rPr lang="ko-KR" altLang="en-US"/>
+              <a:t>이 토큰으로 </a:t>
+            </a:r>
+            <a:r>
+              <a:rPr lang="en-US" altLang="ko-KR"/>
+              <a:t>STOMP </a:t>
+            </a:r>
+            <a:r>
+              <a:rPr lang="ko-KR" altLang="en-US"/>
+              <a:t>연결시 사용한다</a:t>
+            </a:r>
+            <a:r>
+              <a:rPr lang="en-US" altLang="ko-KR"/>
+              <a:t>.</a:t>
+            </a:r>
+          </a:p>
+          <a:p>
+            <a:pPr marL="285750" indent="-285750">
+              <a:buFont typeface="Arial" panose="020B0604020202020204" pitchFamily="34" charset="0"/>
+              <a:buChar char="•"/>
+            </a:pPr>
+            <a:r>
+              <a:rPr lang="ko-KR" altLang="en-US"/>
+              <a:t>방 입장</a:t>
+            </a:r>
+            <a:endParaRPr lang="en-US" altLang="ko-KR"/>
+          </a:p>
+          <a:p>
+            <a:pPr marL="742950" lvl="1" indent="-285750">
+              <a:buFont typeface="Arial" panose="020B0604020202020204" pitchFamily="34" charset="0"/>
+              <a:buChar char="•"/>
+            </a:pPr>
+            <a:r>
+              <a:rPr lang="ko-KR" altLang="en-US"/>
+              <a:t>다른 사람은 </a:t>
+            </a:r>
+            <a:r>
+              <a:rPr lang="en-US" altLang="ko-KR"/>
+              <a:t>room id</a:t>
+            </a:r>
+            <a:r>
+              <a:rPr lang="ko-KR" altLang="en-US"/>
+              <a:t>를 알고 있다</a:t>
+            </a:r>
+            <a:r>
+              <a:rPr lang="en-US" altLang="ko-KR"/>
+              <a:t>.</a:t>
+            </a:r>
+          </a:p>
+          <a:p>
+            <a:pPr marL="742950" lvl="1" indent="-285750">
+              <a:buFont typeface="Arial" panose="020B0604020202020204" pitchFamily="34" charset="0"/>
+              <a:buChar char="•"/>
+            </a:pPr>
+            <a:r>
+              <a:rPr lang="ko-KR" altLang="en-US"/>
+              <a:t>해당 </a:t>
+            </a:r>
+            <a:r>
+              <a:rPr lang="en-US" altLang="ko-KR"/>
+              <a:t>roomid</a:t>
+            </a:r>
+            <a:r>
+              <a:rPr lang="ko-KR" altLang="en-US"/>
+              <a:t>를 가지고 방입장을 요청하면</a:t>
+            </a:r>
+            <a:r>
+              <a:rPr lang="en-US" altLang="ko-KR"/>
+              <a:t>(http) </a:t>
+            </a:r>
+            <a:r>
+              <a:rPr lang="ko-KR" altLang="en-US"/>
+              <a:t>마찬가지로 토큰을 받는다</a:t>
+            </a:r>
+            <a:r>
+              <a:rPr lang="en-US" altLang="ko-KR"/>
+              <a:t>.</a:t>
+            </a:r>
+          </a:p>
+          <a:p>
+            <a:pPr marL="742950" lvl="1" indent="-285750">
+              <a:buFont typeface="Arial" panose="020B0604020202020204" pitchFamily="34" charset="0"/>
+              <a:buChar char="•"/>
+            </a:pPr>
+            <a:r>
+              <a:rPr lang="ko-KR" altLang="en-US"/>
+              <a:t>이 토큰으로 </a:t>
+            </a:r>
+            <a:r>
+              <a:rPr lang="en-US" altLang="ko-KR"/>
+              <a:t>STOMP </a:t>
+            </a:r>
+            <a:r>
+              <a:rPr lang="ko-KR" altLang="en-US"/>
+              <a:t>연결시 사용한다</a:t>
+            </a:r>
+            <a:r>
+              <a:rPr lang="en-US" altLang="ko-KR"/>
+              <a:t>.</a:t>
+            </a:r>
+          </a:p>
+          <a:p>
+            <a:pPr marL="742950" lvl="1" indent="-285750">
+              <a:buFont typeface="Arial" panose="020B0604020202020204" pitchFamily="34" charset="0"/>
+              <a:buChar char="•"/>
+            </a:pPr>
+            <a:endParaRPr lang="en-US" altLang="ko-KR"/>
+          </a:p>
+          <a:p>
+            <a:pPr marL="285750" indent="-285750">
+              <a:buFont typeface="Arial" panose="020B0604020202020204" pitchFamily="34" charset="0"/>
+              <a:buChar char="•"/>
+            </a:pPr>
+            <a:r>
+              <a:rPr lang="ko-KR" altLang="en-US"/>
+              <a:t>고려할점</a:t>
+            </a:r>
+            <a:endParaRPr lang="en-US" altLang="ko-KR"/>
+          </a:p>
+          <a:p>
+            <a:pPr marL="742950" lvl="1" indent="-285750">
+              <a:buFont typeface="Arial" panose="020B0604020202020204" pitchFamily="34" charset="0"/>
+              <a:buChar char="•"/>
+            </a:pPr>
+            <a:r>
+              <a:rPr lang="ko-KR" altLang="en-US"/>
+              <a:t>정상적이지 않은 방법으로 </a:t>
+            </a:r>
+            <a:r>
+              <a:rPr lang="en-US" altLang="ko-KR"/>
+              <a:t>websocket </a:t>
+            </a:r>
+            <a:r>
+              <a:rPr lang="ko-KR" altLang="en-US"/>
+              <a:t>연결이 끊겼을때 </a:t>
+            </a:r>
+            <a:r>
+              <a:rPr lang="en-US" altLang="ko-KR"/>
+              <a:t>RoomService</a:t>
+            </a:r>
+            <a:r>
+              <a:rPr lang="ko-KR" altLang="en-US"/>
+              <a:t>쪽으로 처리해줘야한다</a:t>
+            </a:r>
+            <a:r>
+              <a:rPr lang="en-US" altLang="ko-KR"/>
+              <a:t>.</a:t>
+            </a:r>
+          </a:p>
+        </p:txBody>
+      </p:sp>
+      <p:sp>
+        <p:nvSpPr>
+          <p:cNvPr id="4" name="제목 4">
+            <a:extLst>
+              <a:ext uri="{FF2B5EF4-FFF2-40B4-BE49-F238E27FC236}">
+                <a16:creationId xmlns:a16="http://schemas.microsoft.com/office/drawing/2014/main" id="{0F0AB430-AB97-8F46-B2EC-7C132A4B6642}"/>
               </a:ext>
             </a:extLst>
           </p:cNvPr>
@@ -4831,319 +5086,16 @@
           <a:lstStyle/>
           <a:p>
             <a:r>
-              <a:rPr lang="en-US" altLang="ko-KR" sz="3200" u="sng"/>
-              <a:t>GameManager</a:t>
-            </a:r>
-            <a:endParaRPr lang="ko-KR" altLang="en-US" sz="3200" u="sng"/>
-          </a:p>
-        </p:txBody>
-      </p:sp>
-      <p:sp>
-        <p:nvSpPr>
-          <p:cNvPr id="2" name="TextBox 1">
-            <a:extLst>
-              <a:ext uri="{FF2B5EF4-FFF2-40B4-BE49-F238E27FC236}">
-                <a16:creationId xmlns:a16="http://schemas.microsoft.com/office/drawing/2014/main" id="{10644CBD-FE2C-6596-D141-E729B130417F}"/>
-              </a:ext>
-            </a:extLst>
-          </p:cNvPr>
-          <p:cNvSpPr txBox="1"/>
-          <p:nvPr/>
-        </p:nvSpPr>
-        <p:spPr>
-          <a:xfrm>
-            <a:off x="302004" y="964734"/>
-            <a:ext cx="10377181" cy="5909310"/>
-          </a:xfrm>
-          <a:prstGeom prst="rect">
-            <a:avLst/>
-          </a:prstGeom>
-          <a:noFill/>
-        </p:spPr>
-        <p:txBody>
-          <a:bodyPr wrap="square" rtlCol="0">
-            <a:spAutoFit/>
-          </a:bodyPr>
-          <a:lstStyle/>
-          <a:p>
-            <a:pPr marL="342900" indent="-342900">
-              <a:buAutoNum type="arabicPeriod"/>
-            </a:pPr>
-            <a:r>
-              <a:rPr lang="ko-KR" altLang="en-US"/>
-              <a:t>게임방의 전체적인 사이클 관리를 위해 매니저가 필요</a:t>
-            </a:r>
-            <a:endParaRPr lang="en-US" altLang="ko-KR"/>
-          </a:p>
-          <a:p>
-            <a:pPr marL="342900" indent="-342900">
-              <a:buAutoNum type="arabicPeriod"/>
-            </a:pPr>
-            <a:r>
-              <a:rPr lang="ko-KR" altLang="en-US"/>
-              <a:t>게임 진행에 대한 관리</a:t>
-            </a:r>
-            <a:endParaRPr lang="en-US" altLang="ko-KR"/>
-          </a:p>
-          <a:p>
-            <a:pPr marL="800100" lvl="1" indent="-342900">
-              <a:buAutoNum type="arabicPeriod"/>
-            </a:pPr>
-            <a:r>
-              <a:rPr lang="ko-KR" altLang="en-US"/>
-              <a:t>현재 게임 진행 정보를 갖음</a:t>
-            </a:r>
-            <a:endParaRPr lang="en-US" altLang="ko-KR"/>
-          </a:p>
-          <a:p>
-            <a:pPr marL="1257300" lvl="2" indent="-342900">
-              <a:buAutoNum type="arabicPeriod"/>
-            </a:pPr>
-            <a:r>
-              <a:rPr lang="ko-KR" altLang="en-US"/>
-              <a:t>룸마다 현재 게임 단계에 대한 정보를 갖는 </a:t>
-            </a:r>
-            <a:r>
-              <a:rPr lang="en-US" altLang="ko-KR"/>
-              <a:t>attribute</a:t>
-            </a:r>
-            <a:r>
-              <a:rPr lang="ko-KR" altLang="en-US"/>
-              <a:t>가 필요</a:t>
-            </a:r>
-            <a:endParaRPr lang="en-US" altLang="ko-KR"/>
-          </a:p>
-          <a:p>
-            <a:pPr marL="800100" lvl="1" indent="-342900">
-              <a:buAutoNum type="arabicPeriod"/>
-            </a:pPr>
-            <a:r>
-              <a:rPr lang="ko-KR" altLang="en-US"/>
-              <a:t>게임 진행상황을 </a:t>
-            </a:r>
-            <a:r>
-              <a:rPr lang="en-US" altLang="ko-KR"/>
-              <a:t>room </a:t>
-            </a:r>
-            <a:r>
-              <a:rPr lang="ko-KR" altLang="en-US"/>
-              <a:t>내부 사용자에게 알린다</a:t>
-            </a:r>
-            <a:r>
-              <a:rPr lang="en-US" altLang="ko-KR"/>
-              <a:t>.</a:t>
-            </a:r>
-          </a:p>
-          <a:p>
-            <a:pPr marL="800100" lvl="1" indent="-342900">
-              <a:buAutoNum type="arabicPeriod"/>
-            </a:pPr>
-            <a:r>
-              <a:rPr lang="en-US" altLang="ko-KR"/>
-              <a:t>RoundController</a:t>
-            </a:r>
-            <a:r>
-              <a:rPr lang="ko-KR" altLang="en-US"/>
-              <a:t>에게 룸정보와</a:t>
-            </a:r>
-            <a:r>
-              <a:rPr lang="en-US" altLang="ko-KR"/>
-              <a:t>, </a:t>
-            </a:r>
-            <a:r>
-              <a:rPr lang="ko-KR" altLang="en-US"/>
-              <a:t>게임설정 정보를 보낸다</a:t>
-            </a:r>
-            <a:r>
-              <a:rPr lang="en-US" altLang="ko-KR"/>
-              <a:t>.</a:t>
-            </a:r>
-          </a:p>
-          <a:p>
-            <a:pPr marL="800100" lvl="1" indent="-342900">
-              <a:buAutoNum type="arabicPeriod"/>
-            </a:pPr>
-            <a:endParaRPr lang="en-US" altLang="ko-KR"/>
-          </a:p>
-          <a:p>
-            <a:pPr marL="342900" indent="-342900">
-              <a:buAutoNum type="arabicPeriod"/>
-            </a:pPr>
-            <a:r>
-              <a:rPr lang="en-US" altLang="ko-KR"/>
-              <a:t>(</a:t>
-            </a:r>
-            <a:r>
-              <a:rPr lang="ko-KR" altLang="en-US"/>
-              <a:t>클라이언트에서 생성시</a:t>
-            </a:r>
-            <a:r>
-              <a:rPr lang="en-US" altLang="ko-KR"/>
-              <a:t>) (/)</a:t>
-            </a:r>
-            <a:br>
-              <a:rPr lang="en-US" altLang="ko-KR"/>
-            </a:br>
-            <a:r>
-              <a:rPr lang="ko-KR" altLang="en-US"/>
-              <a:t>방생성시 게임매니저가 방장 클라이언트에서 생성된다</a:t>
-            </a:r>
-            <a:r>
-              <a:rPr lang="en-US" altLang="ko-KR"/>
-              <a:t>.</a:t>
-            </a:r>
-          </a:p>
-          <a:p>
-            <a:pPr marL="800100" lvl="1" indent="-342900">
-              <a:buAutoNum type="arabicPeriod"/>
-            </a:pPr>
-            <a:r>
-              <a:rPr lang="ko-KR" altLang="en-US"/>
-              <a:t>다른 참가자가 들어올때 참가자가 추가적인 메시지를 날려줘야 게임매니저가 인식할 수 있다</a:t>
-            </a:r>
-            <a:r>
-              <a:rPr lang="en-US" altLang="ko-KR"/>
-              <a:t>.</a:t>
-            </a:r>
-          </a:p>
-          <a:p>
-            <a:pPr marL="800100" lvl="1" indent="-342900">
-              <a:buAutoNum type="arabicPeriod"/>
-            </a:pPr>
-            <a:endParaRPr lang="en-US" altLang="ko-KR"/>
-          </a:p>
-          <a:p>
-            <a:pPr marL="342900" indent="-342900">
-              <a:buAutoNum type="arabicPeriod"/>
-            </a:pPr>
-            <a:r>
-              <a:rPr lang="en-US" altLang="ko-KR"/>
-              <a:t>(</a:t>
-            </a:r>
-            <a:r>
-              <a:rPr lang="ko-KR" altLang="en-US"/>
-              <a:t>서버에서 생성시</a:t>
-            </a:r>
-            <a:r>
-              <a:rPr lang="en-US" altLang="ko-KR"/>
-              <a:t>)</a:t>
-            </a:r>
-            <a:br>
-              <a:rPr lang="en-US" altLang="ko-KR"/>
-            </a:br>
-            <a:r>
-              <a:rPr lang="ko-KR" altLang="en-US"/>
-              <a:t>클라이언트는 </a:t>
-            </a:r>
-            <a:r>
-              <a:rPr lang="en-US" altLang="ko-KR"/>
-              <a:t>gameManager</a:t>
-            </a:r>
-            <a:r>
-              <a:rPr lang="ko-KR" altLang="en-US"/>
-              <a:t>와 통신하기 위해 </a:t>
-            </a:r>
-            <a:r>
-              <a:rPr lang="en-US" altLang="ko-KR"/>
-              <a:t>http, websocket</a:t>
-            </a:r>
-            <a:r>
-              <a:rPr lang="ko-KR" altLang="en-US"/>
-              <a:t>을 사용할 수 있다</a:t>
-            </a:r>
-            <a:r>
-              <a:rPr lang="en-US" altLang="ko-KR"/>
-              <a:t>.</a:t>
-            </a:r>
-          </a:p>
-          <a:p>
-            <a:pPr marL="800100" lvl="1" indent="-342900">
-              <a:buAutoNum type="arabicPeriod"/>
-            </a:pPr>
-            <a:r>
-              <a:rPr lang="en-US" altLang="ko-KR"/>
-              <a:t>websocket</a:t>
-            </a:r>
-            <a:br>
-              <a:rPr lang="en-US" altLang="ko-KR"/>
-            </a:br>
-            <a:r>
-              <a:rPr lang="en-US" altLang="ko-KR"/>
-              <a:t>roomcontroller</a:t>
-            </a:r>
-            <a:r>
-              <a:rPr lang="ko-KR" altLang="en-US"/>
-              <a:t>에서 클라이언트로 방관련 </a:t>
-            </a:r>
-            <a:r>
-              <a:rPr lang="en-US" altLang="ko-KR"/>
-              <a:t>api</a:t>
-            </a:r>
-            <a:r>
-              <a:rPr lang="ko-KR" altLang="en-US"/>
-              <a:t>에 따른 응답에 해당 </a:t>
-            </a:r>
-            <a:r>
-              <a:rPr lang="en-US" altLang="ko-KR"/>
-              <a:t>websocket</a:t>
-            </a:r>
-            <a:r>
-              <a:rPr lang="ko-KR" altLang="en-US"/>
-              <a:t> 정보를 넣어주면된다</a:t>
-            </a:r>
-            <a:r>
-              <a:rPr lang="en-US" altLang="ko-KR"/>
-              <a:t>.</a:t>
-            </a:r>
-          </a:p>
-          <a:p>
-            <a:pPr marL="800100" lvl="1" indent="-342900">
-              <a:buAutoNum type="arabicPeriod"/>
-            </a:pPr>
-            <a:r>
-              <a:rPr lang="en-US" altLang="ko-KR"/>
-              <a:t>http</a:t>
-            </a:r>
-            <a:br>
-              <a:rPr lang="en-US" altLang="ko-KR"/>
-            </a:br>
-            <a:r>
-              <a:rPr lang="ko-KR" altLang="en-US"/>
-              <a:t>클라이언트의 요청없이 서버에서 클라이언트로 바로 전달할 방법이 없고</a:t>
-            </a:r>
-            <a:r>
-              <a:rPr lang="en-US" altLang="ko-KR"/>
-              <a:t>, </a:t>
-            </a:r>
-            <a:r>
-              <a:rPr lang="ko-KR" altLang="en-US"/>
-              <a:t>클라입장에서</a:t>
-            </a:r>
-            <a:r>
-              <a:rPr lang="en-US" altLang="ko-KR"/>
-              <a:t> polling </a:t>
-            </a:r>
-            <a:r>
-              <a:rPr lang="ko-KR" altLang="en-US"/>
-              <a:t>방식으로 해야하기 때문에 클라이언트의 부담이 크다</a:t>
-            </a:r>
-            <a:r>
-              <a:rPr lang="en-US" altLang="ko-KR"/>
-              <a:t>.</a:t>
-            </a:r>
-          </a:p>
-          <a:p>
-            <a:pPr marL="342900" indent="-342900">
-              <a:buAutoNum type="arabicPeriod"/>
-            </a:pPr>
-            <a:endParaRPr lang="en-US" altLang="ko-KR"/>
+              <a:rPr lang="ko-KR" altLang="en-US" sz="3200" u="sng"/>
+              <a:t>보안</a:t>
+            </a:r>
           </a:p>
         </p:txBody>
       </p:sp>
     </p:spTree>
     <p:extLst>
       <p:ext uri="{BB962C8B-B14F-4D97-AF65-F5344CB8AC3E}">
-        <p14:creationId xmlns:p14="http://schemas.microsoft.com/office/powerpoint/2010/main" val="1787410965"/>
+        <p14:creationId xmlns:p14="http://schemas.microsoft.com/office/powerpoint/2010/main" val="3651619003"/>
       </p:ext>
     </p:extLst>
   </p:cSld>
@@ -5221,7 +5173,7 @@
         <p:spPr>
           <a:xfrm>
             <a:off x="302004" y="964734"/>
-            <a:ext cx="10377181" cy="5632311"/>
+            <a:ext cx="10377181" cy="5909310"/>
           </a:xfrm>
           <a:prstGeom prst="rect">
             <a:avLst/>
@@ -5235,42 +5187,31 @@
           <a:lstStyle/>
           <a:p>
             <a:pPr marL="342900" indent="-342900">
-              <a:buFont typeface="+mj-lt"/>
               <a:buAutoNum type="arabicPeriod"/>
             </a:pPr>
             <a:r>
               <a:rPr lang="ko-KR" altLang="en-US"/>
-              <a:t>방장 클라이언트에서</a:t>
-            </a:r>
-            <a:r>
-              <a:rPr lang="en-US" altLang="ko-KR"/>
-              <a:t> </a:t>
-            </a:r>
-            <a:r>
-              <a:rPr lang="ko-KR" altLang="en-US"/>
-              <a:t>라운드 각단계에 따라 </a:t>
-            </a:r>
-            <a:r>
-              <a:rPr lang="en-US" altLang="ko-KR"/>
-              <a:t>http</a:t>
-            </a:r>
-            <a:r>
-              <a:rPr lang="ko-KR" altLang="en-US"/>
-              <a:t>로 요청한다</a:t>
-            </a:r>
-            <a:r>
-              <a:rPr lang="en-US" altLang="ko-KR"/>
-              <a:t>.</a:t>
-            </a:r>
+              <a:t>게임방의 전체적인 사이클 관리를 위해 매니저가 필요</a:t>
+            </a:r>
+            <a:endParaRPr lang="en-US" altLang="ko-KR"/>
+          </a:p>
+          <a:p>
+            <a:pPr marL="342900" indent="-342900">
+              <a:buAutoNum type="arabicPeriod"/>
+            </a:pPr>
+            <a:r>
+              <a:rPr lang="ko-KR" altLang="en-US"/>
+              <a:t>게임 진행에 대한 관리</a:t>
+            </a:r>
+            <a:endParaRPr lang="en-US" altLang="ko-KR"/>
           </a:p>
           <a:p>
             <a:pPr marL="800100" lvl="1" indent="-342900">
-              <a:buFont typeface="Arial" panose="020B0604020202020204" pitchFamily="34" charset="0"/>
-              <a:buChar char="•"/>
+              <a:buAutoNum type="arabicPeriod"/>
             </a:pPr>
             <a:r>
               <a:rPr lang="ko-KR" altLang="en-US"/>
-              <a:t>게임시작</a:t>
+              <a:t>현재 게임 진행 정보를 갖음</a:t>
             </a:r>
             <a:endParaRPr lang="en-US" altLang="ko-KR"/>
           </a:p>
@@ -5279,12 +5220,51 @@
               <a:buAutoNum type="arabicPeriod"/>
             </a:pPr>
             <a:r>
+              <a:rPr lang="ko-KR" altLang="en-US"/>
+              <a:t>룸마다 현재 게임 단계에 대한 정보를 갖는 </a:t>
+            </a:r>
+            <a:r>
               <a:rPr lang="en-US" altLang="ko-KR"/>
-              <a:t>GameManager</a:t>
-            </a:r>
-            <a:r>
-              <a:rPr lang="ko-KR" altLang="en-US"/>
-              <a:t>는 룸정보</a:t>
+              <a:t>attribute</a:t>
+            </a:r>
+            <a:r>
+              <a:rPr lang="ko-KR" altLang="en-US"/>
+              <a:t>가 필요</a:t>
+            </a:r>
+            <a:endParaRPr lang="en-US" altLang="ko-KR"/>
+          </a:p>
+          <a:p>
+            <a:pPr marL="800100" lvl="1" indent="-342900">
+              <a:buAutoNum type="arabicPeriod"/>
+            </a:pPr>
+            <a:r>
+              <a:rPr lang="ko-KR" altLang="en-US"/>
+              <a:t>게임 진행상황을 </a:t>
+            </a:r>
+            <a:r>
+              <a:rPr lang="en-US" altLang="ko-KR"/>
+              <a:t>room </a:t>
+            </a:r>
+            <a:r>
+              <a:rPr lang="ko-KR" altLang="en-US"/>
+              <a:t>내부 사용자에게 알린다</a:t>
+            </a:r>
+            <a:r>
+              <a:rPr lang="en-US" altLang="ko-KR"/>
+              <a:t>.</a:t>
+            </a:r>
+          </a:p>
+          <a:p>
+            <a:pPr marL="800100" lvl="1" indent="-342900">
+              <a:buAutoNum type="arabicPeriod"/>
+            </a:pPr>
+            <a:r>
+              <a:rPr lang="en-US" altLang="ko-KR"/>
+              <a:t>RoundController</a:t>
+            </a:r>
+            <a:r>
+              <a:rPr lang="ko-KR" altLang="en-US"/>
+              <a:t>에게 룸정보와</a:t>
             </a:r>
             <a:r>
               <a:rPr lang="en-US" altLang="ko-KR"/>
@@ -5292,30 +5272,41 @@
             </a:r>
             <a:r>
               <a:rPr lang="ko-KR" altLang="en-US"/>
-              <a:t>게임설정 정보를 </a:t>
+              <a:t>게임설정 정보를 보낸다</a:t>
             </a:r>
             <a:r>
               <a:rPr lang="en-US" altLang="ko-KR"/>
-              <a:t>RoundController</a:t>
-            </a:r>
-            <a:r>
-              <a:rPr lang="ko-KR" altLang="en-US"/>
-              <a:t>에 전달하면</a:t>
-            </a:r>
+              <a:t>.</a:t>
+            </a:r>
+          </a:p>
+          <a:p>
+            <a:pPr marL="800100" lvl="1" indent="-342900">
+              <a:buAutoNum type="arabicPeriod"/>
+            </a:pPr>
+            <a:endParaRPr lang="en-US" altLang="ko-KR"/>
+          </a:p>
+          <a:p>
+            <a:pPr marL="342900" indent="-342900">
+              <a:buAutoNum type="arabicPeriod"/>
+            </a:pPr>
             <a:r>
               <a:rPr lang="en-US" altLang="ko-KR"/>
-              <a:t>,</a:t>
+              <a:t>(</a:t>
+            </a:r>
+            <a:r>
+              <a:rPr lang="ko-KR" altLang="en-US"/>
+              <a:t>클라이언트에서 생성시</a:t>
+            </a:r>
+            <a:r>
+              <a:rPr lang="en-US" altLang="ko-KR"/>
+              <a:t>) (/)</a:t>
             </a:r>
             <a:br>
               <a:rPr lang="en-US" altLang="ko-KR"/>
             </a:br>
             <a:r>
-              <a:rPr lang="en-US" altLang="ko-KR"/>
-              <a:t>RoundController</a:t>
-            </a:r>
-            <a:r>
-              <a:rPr lang="ko-KR" altLang="en-US"/>
-              <a:t>는 라이어게임 설명하는 사용자 순서를 보낸다</a:t>
+              <a:rPr lang="ko-KR" altLang="en-US"/>
+              <a:t>방생성시 게임매니저가 방장 클라이언트에서 생성된다</a:t>
             </a:r>
             <a:r>
               <a:rPr lang="en-US" altLang="ko-KR"/>
@@ -5324,30 +5315,11 @@
           </a:p>
           <a:p>
             <a:pPr marL="800100" lvl="1" indent="-342900">
-              <a:buFont typeface="Arial" panose="020B0604020202020204" pitchFamily="34" charset="0"/>
-              <a:buChar char="•"/>
-            </a:pPr>
-            <a:r>
-              <a:rPr lang="ko-KR" altLang="en-US"/>
-              <a:t>라이어선정</a:t>
-            </a:r>
-            <a:endParaRPr lang="en-US" altLang="ko-KR"/>
-          </a:p>
-          <a:p>
-            <a:pPr marL="1257300" lvl="2" indent="-342900">
               <a:buAutoNum type="arabicPeriod"/>
             </a:pPr>
             <a:r>
               <a:rPr lang="ko-KR" altLang="en-US"/>
-              <a:t>사용자는 라이어선정이 완료될때마다 </a:t>
-            </a:r>
-            <a:r>
-              <a:rPr lang="en-US" altLang="ko-KR"/>
-              <a:t>GameManager</a:t>
-            </a:r>
-            <a:r>
-              <a:rPr lang="ko-KR" altLang="en-US"/>
-              <a:t>에게 알린다</a:t>
+              <a:t>다른 참가자가 들어올때 참가자가 추가적인 메시지를 날려줘야 게임매니저가 인식할 수 있다</a:t>
             </a:r>
             <a:r>
               <a:rPr lang="en-US" altLang="ko-KR"/>
@@ -5356,38 +5328,48 @@
           </a:p>
           <a:p>
             <a:pPr marL="800100" lvl="1" indent="-342900">
-              <a:buFont typeface="Arial" panose="020B0604020202020204" pitchFamily="34" charset="0"/>
-              <a:buChar char="•"/>
-            </a:pPr>
-            <a:r>
-              <a:rPr lang="ko-KR" altLang="en-US"/>
-              <a:t>카테고리 제시</a:t>
-            </a:r>
-            <a:r>
-              <a:rPr lang="en-US" altLang="ko-KR"/>
-              <a:t>,</a:t>
-            </a:r>
-            <a:r>
-              <a:rPr lang="ko-KR" altLang="en-US"/>
-              <a:t>키워드 공개</a:t>
-            </a:r>
-            <a:endParaRPr lang="en-US" altLang="ko-KR"/>
-          </a:p>
-          <a:p>
-            <a:pPr marL="1257300" lvl="2" indent="-342900">
               <a:buAutoNum type="arabicPeriod"/>
             </a:pPr>
-            <a:r>
-              <a:rPr lang="ko-KR" altLang="en-US"/>
-              <a:t>사용자는 키워드를 받으면</a:t>
-            </a:r>
+            <a:endParaRPr lang="en-US" altLang="ko-KR"/>
+          </a:p>
+          <a:p>
+            <a:pPr marL="342900" indent="-342900">
+              <a:buAutoNum type="arabicPeriod"/>
+            </a:pPr>
             <a:r>
               <a:rPr lang="en-US" altLang="ko-KR"/>
-              <a:t>, GameManager</a:t>
-            </a:r>
-            <a:r>
-              <a:rPr lang="ko-KR" altLang="en-US"/>
-              <a:t>에게 알린다</a:t>
+              <a:t>(</a:t>
+            </a:r>
+            <a:r>
+              <a:rPr lang="ko-KR" altLang="en-US"/>
+              <a:t>서버에서 생성시</a:t>
+            </a:r>
+            <a:r>
+              <a:rPr lang="en-US" altLang="ko-KR"/>
+              <a:t>)</a:t>
+            </a:r>
+            <a:br>
+              <a:rPr lang="en-US" altLang="ko-KR"/>
+            </a:br>
+            <a:r>
+              <a:rPr lang="ko-KR" altLang="en-US"/>
+              <a:t>클라이언트는 </a:t>
+            </a:r>
+            <a:r>
+              <a:rPr lang="en-US" altLang="ko-KR"/>
+              <a:t>gameManager</a:t>
+            </a:r>
+            <a:r>
+              <a:rPr lang="ko-KR" altLang="en-US"/>
+              <a:t>와 통신하기 위해 </a:t>
+            </a:r>
+            <a:r>
+              <a:rPr lang="en-US" altLang="ko-KR"/>
+              <a:t>http, websocket</a:t>
+            </a:r>
+            <a:r>
+              <a:rPr lang="ko-KR" altLang="en-US"/>
+              <a:t>을 사용할 수 있다</a:t>
             </a:r>
             <a:r>
               <a:rPr lang="en-US" altLang="ko-KR"/>
@@ -5396,31 +5378,38 @@
           </a:p>
           <a:p>
             <a:pPr marL="800100" lvl="1" indent="-342900">
-              <a:buFont typeface="Arial" panose="020B0604020202020204" pitchFamily="34" charset="0"/>
-              <a:buChar char="•"/>
-            </a:pPr>
-            <a:r>
-              <a:rPr lang="ko-KR" altLang="en-US"/>
-              <a:t>게임 진행</a:t>
-            </a:r>
-            <a:endParaRPr lang="en-US" altLang="ko-KR"/>
-          </a:p>
-          <a:p>
-            <a:pPr marL="1257300" lvl="2" indent="-342900">
-              <a:buFontTx/>
               <a:buAutoNum type="arabicPeriod"/>
             </a:pPr>
             <a:r>
-              <a:rPr lang="ko-KR" altLang="en-US"/>
-              <a:t>게임 진행단계에서 </a:t>
-            </a:r>
-            <a:r>
               <a:rPr lang="en-US" altLang="ko-KR"/>
-              <a:t>RoundController</a:t>
-            </a:r>
-            <a:r>
-              <a:rPr lang="ko-KR" altLang="en-US"/>
-              <a:t>에 게임이 시작되었음을 알린다</a:t>
+              <a:t>websocket</a:t>
+            </a:r>
+            <a:br>
+              <a:rPr lang="en-US" altLang="ko-KR"/>
+            </a:br>
+            <a:r>
+              <a:rPr lang="en-US" altLang="ko-KR"/>
+              <a:t>roomcontroller</a:t>
+            </a:r>
+            <a:r>
+              <a:rPr lang="ko-KR" altLang="en-US"/>
+              <a:t>에서 클라이언트로 방관련 </a:t>
+            </a:r>
+            <a:r>
+              <a:rPr lang="en-US" altLang="ko-KR"/>
+              <a:t>api</a:t>
+            </a:r>
+            <a:r>
+              <a:rPr lang="ko-KR" altLang="en-US"/>
+              <a:t>에 따른 응답에 해당 </a:t>
+            </a:r>
+            <a:r>
+              <a:rPr lang="en-US" altLang="ko-KR"/>
+              <a:t>websocket</a:t>
+            </a:r>
+            <a:r>
+              <a:rPr lang="ko-KR" altLang="en-US"/>
+              <a:t> 정보를 넣어주면된다</a:t>
             </a:r>
             <a:r>
               <a:rPr lang="en-US" altLang="ko-KR"/>
@@ -5428,13 +5417,19 @@
             </a:r>
           </a:p>
           <a:p>
-            <a:pPr marL="1257300" lvl="2" indent="-342900">
-              <a:buFontTx/>
+            <a:pPr marL="800100" lvl="1" indent="-342900">
               <a:buAutoNum type="arabicPeriod"/>
             </a:pPr>
             <a:r>
-              <a:rPr lang="ko-KR" altLang="en-US"/>
-              <a:t>내부적으로 타이머를 돌리며</a:t>
+              <a:rPr lang="en-US" altLang="ko-KR"/>
+              <a:t>http</a:t>
+            </a:r>
+            <a:br>
+              <a:rPr lang="en-US" altLang="ko-KR"/>
+            </a:br>
+            <a:r>
+              <a:rPr lang="ko-KR" altLang="en-US"/>
+              <a:t>클라이언트의 요청없이 서버에서 클라이언트로 바로 전달할 방법이 없고</a:t>
             </a:r>
             <a:r>
               <a:rPr lang="en-US" altLang="ko-KR"/>
@@ -5442,15 +5437,15 @@
             </a:r>
             <a:r>
               <a:rPr lang="ko-KR" altLang="en-US"/>
-              <a:t>각 사용자가 대답할 수 있는 시간을 정해두고</a:t>
+              <a:t>클라입장에서</a:t>
             </a:r>
             <a:r>
               <a:rPr lang="en-US" altLang="ko-KR"/>
-              <a:t>, </a:t>
-            </a:r>
-            <a:r>
-              <a:rPr lang="ko-KR" altLang="en-US"/>
-              <a:t>타임아웃되면 다음 사용자턴임을 알린다</a:t>
+              <a:t> polling </a:t>
+            </a:r>
+            <a:r>
+              <a:rPr lang="ko-KR" altLang="en-US"/>
+              <a:t>방식으로 해야하기 때문에 클라이언트의 부담이 크다</a:t>
             </a:r>
             <a:r>
               <a:rPr lang="en-US" altLang="ko-KR"/>
@@ -5458,111 +5453,7 @@
             </a:r>
           </a:p>
           <a:p>
-            <a:pPr lvl="2"/>
-            <a:endParaRPr lang="en-US" altLang="ko-KR"/>
-          </a:p>
-          <a:p>
-            <a:pPr marL="800100" lvl="1" indent="-342900">
-              <a:buFont typeface="Arial" panose="020B0604020202020204" pitchFamily="34" charset="0"/>
-              <a:buChar char="•"/>
-            </a:pPr>
-            <a:r>
-              <a:rPr lang="ko-KR" altLang="en-US"/>
-              <a:t>라이어 투표</a:t>
-            </a:r>
-            <a:endParaRPr lang="en-US" altLang="ko-KR"/>
-          </a:p>
-          <a:p>
-            <a:pPr marL="1257300" lvl="2" indent="-342900">
-              <a:buFont typeface="Arial" panose="020B0604020202020204" pitchFamily="34" charset="0"/>
-              <a:buChar char="•"/>
-            </a:pPr>
-            <a:r>
-              <a:rPr lang="ko-KR" altLang="en-US"/>
-              <a:t>사용자는 라이어 투표 결과를 </a:t>
-            </a:r>
-            <a:r>
-              <a:rPr lang="en-US" altLang="ko-KR"/>
-              <a:t>GameManager</a:t>
-            </a:r>
-            <a:r>
-              <a:rPr lang="ko-KR" altLang="en-US"/>
-              <a:t>에게 알린다</a:t>
-            </a:r>
-            <a:r>
-              <a:rPr lang="en-US" altLang="ko-KR"/>
-              <a:t>.</a:t>
-            </a:r>
-          </a:p>
-          <a:p>
-            <a:pPr marL="800100" lvl="1" indent="-342900">
-              <a:buFont typeface="Arial" panose="020B0604020202020204" pitchFamily="34" charset="0"/>
-              <a:buChar char="•"/>
-            </a:pPr>
-            <a:r>
-              <a:rPr lang="ko-KR" altLang="en-US"/>
-              <a:t>라이어 공개</a:t>
-            </a:r>
-            <a:endParaRPr lang="en-US" altLang="ko-KR"/>
-          </a:p>
-          <a:p>
-            <a:pPr marL="1257300" lvl="2" indent="-342900">
-              <a:buFont typeface="Arial" panose="020B0604020202020204" pitchFamily="34" charset="0"/>
-              <a:buChar char="•"/>
-            </a:pPr>
-            <a:r>
-              <a:rPr lang="en-US" altLang="ko-KR"/>
-              <a:t>GameManager</a:t>
-            </a:r>
-            <a:r>
-              <a:rPr lang="ko-KR" altLang="en-US"/>
-              <a:t>는 과반수를 체크하여 라이어를 공개시킬지</a:t>
-            </a:r>
-            <a:r>
-              <a:rPr lang="en-US" altLang="ko-KR"/>
-              <a:t>, </a:t>
-            </a:r>
-            <a:r>
-              <a:rPr lang="ko-KR" altLang="en-US"/>
-              <a:t>재투표할지 결정한다</a:t>
-            </a:r>
-            <a:r>
-              <a:rPr lang="en-US" altLang="ko-KR"/>
-              <a:t>.</a:t>
-            </a:r>
-          </a:p>
-          <a:p>
-            <a:pPr marL="800100" lvl="1" indent="-342900">
-              <a:buFont typeface="Arial" panose="020B0604020202020204" pitchFamily="34" charset="0"/>
-              <a:buChar char="•"/>
-            </a:pPr>
-            <a:r>
-              <a:rPr lang="ko-KR" altLang="en-US"/>
-              <a:t>라이어 키워드 맞추기</a:t>
-            </a:r>
-            <a:endParaRPr lang="en-US" altLang="ko-KR"/>
-          </a:p>
-          <a:p>
-            <a:pPr marL="1257300" lvl="2" indent="-342900">
-              <a:buFont typeface="Arial" panose="020B0604020202020204" pitchFamily="34" charset="0"/>
-              <a:buChar char="•"/>
-            </a:pPr>
-            <a:r>
-              <a:rPr lang="en-US" altLang="ko-KR"/>
-              <a:t>GameManager</a:t>
-            </a:r>
-            <a:r>
-              <a:rPr lang="ko-KR" altLang="en-US"/>
-              <a:t>는 라이어에게 키워드를 요청하라고 한다</a:t>
-            </a:r>
-            <a:r>
-              <a:rPr lang="en-US" altLang="ko-KR"/>
-              <a:t>.</a:t>
-            </a:r>
-          </a:p>
-          <a:p>
-            <a:pPr marL="1257300" lvl="2" indent="-342900">
-              <a:buFont typeface="+mj-lt"/>
+            <a:pPr marL="342900" indent="-342900">
               <a:buAutoNum type="arabicPeriod"/>
             </a:pPr>
             <a:endParaRPr lang="en-US" altLang="ko-KR"/>
@@ -5572,7 +5463,7 @@
     </p:spTree>
     <p:extLst>
       <p:ext uri="{BB962C8B-B14F-4D97-AF65-F5344CB8AC3E}">
-        <p14:creationId xmlns:p14="http://schemas.microsoft.com/office/powerpoint/2010/main" val="894388546"/>
+        <p14:creationId xmlns:p14="http://schemas.microsoft.com/office/powerpoint/2010/main" val="1787410965"/>
       </p:ext>
     </p:extLst>
   </p:cSld>
@@ -5618,7 +5509,7 @@
         <p:spPr>
           <a:xfrm>
             <a:off x="183858" y="136449"/>
-            <a:ext cx="5512267" cy="582831"/>
+            <a:ext cx="3012347" cy="582831"/>
           </a:xfrm>
         </p:spPr>
         <p:txBody>
@@ -5629,7 +5520,7 @@
           <a:p>
             <a:r>
               <a:rPr lang="en-US" altLang="ko-KR" sz="3200" u="sng"/>
-              <a:t>RoomController</a:t>
+              <a:t>GameManager</a:t>
             </a:r>
             <a:endParaRPr lang="ko-KR" altLang="en-US" sz="3200" u="sng"/>
           </a:p>
@@ -5650,7 +5541,7 @@
         <p:spPr>
           <a:xfrm>
             <a:off x="302004" y="964734"/>
-            <a:ext cx="10377181" cy="2031325"/>
+            <a:ext cx="10377181" cy="5632311"/>
           </a:xfrm>
           <a:prstGeom prst="rect">
             <a:avLst/>
@@ -5664,71 +5555,192 @@
           <a:lstStyle/>
           <a:p>
             <a:pPr marL="342900" indent="-342900">
+              <a:buFont typeface="+mj-lt"/>
               <a:buAutoNum type="arabicPeriod"/>
             </a:pPr>
             <a:r>
               <a:rPr lang="ko-KR" altLang="en-US"/>
-              <a:t>게임방 관리를 위해 매니저가 필요</a:t>
+              <a:t>방장 클라이언트에서</a:t>
+            </a:r>
+            <a:r>
+              <a:rPr lang="en-US" altLang="ko-KR"/>
+              <a:t> </a:t>
+            </a:r>
+            <a:r>
+              <a:rPr lang="ko-KR" altLang="en-US"/>
+              <a:t>라운드 각단계에 따라 </a:t>
+            </a:r>
+            <a:r>
+              <a:rPr lang="en-US" altLang="ko-KR"/>
+              <a:t>http</a:t>
+            </a:r>
+            <a:r>
+              <a:rPr lang="ko-KR" altLang="en-US"/>
+              <a:t>로 요청한다</a:t>
+            </a:r>
+            <a:r>
+              <a:rPr lang="en-US" altLang="ko-KR"/>
+              <a:t>.</a:t>
+            </a:r>
+          </a:p>
+          <a:p>
+            <a:pPr marL="800100" lvl="1" indent="-342900">
+              <a:buFont typeface="Arial" panose="020B0604020202020204" pitchFamily="34" charset="0"/>
+              <a:buChar char="•"/>
+            </a:pPr>
+            <a:r>
+              <a:rPr lang="ko-KR" altLang="en-US"/>
+              <a:t>게임시작</a:t>
             </a:r>
             <a:endParaRPr lang="en-US" altLang="ko-KR"/>
           </a:p>
           <a:p>
-            <a:pPr marL="342900" indent="-342900">
+            <a:pPr marL="1257300" lvl="2" indent="-342900">
               <a:buAutoNum type="arabicPeriod"/>
             </a:pPr>
             <a:r>
-              <a:rPr lang="ko-KR" altLang="en-US"/>
-              <a:t>게임 진행에 대한 관리</a:t>
+              <a:rPr lang="en-US" altLang="ko-KR"/>
+              <a:t>GameManager</a:t>
+            </a:r>
+            <a:r>
+              <a:rPr lang="ko-KR" altLang="en-US"/>
+              <a:t>는 룸정보</a:t>
+            </a:r>
+            <a:r>
+              <a:rPr lang="en-US" altLang="ko-KR"/>
+              <a:t>, </a:t>
+            </a:r>
+            <a:r>
+              <a:rPr lang="ko-KR" altLang="en-US"/>
+              <a:t>게임설정 정보를 </a:t>
+            </a:r>
+            <a:r>
+              <a:rPr lang="en-US" altLang="ko-KR"/>
+              <a:t>RoundController</a:t>
+            </a:r>
+            <a:r>
+              <a:rPr lang="ko-KR" altLang="en-US"/>
+              <a:t>에 전달하면</a:t>
+            </a:r>
+            <a:r>
+              <a:rPr lang="en-US" altLang="ko-KR"/>
+              <a:t>,</a:t>
+            </a:r>
+            <a:br>
+              <a:rPr lang="en-US" altLang="ko-KR"/>
+            </a:br>
+            <a:r>
+              <a:rPr lang="en-US" altLang="ko-KR"/>
+              <a:t>RoundController</a:t>
+            </a:r>
+            <a:r>
+              <a:rPr lang="ko-KR" altLang="en-US"/>
+              <a:t>는 라이어게임 설명하는 사용자 순서를 보낸다</a:t>
+            </a:r>
+            <a:r>
+              <a:rPr lang="en-US" altLang="ko-KR"/>
+              <a:t>.</a:t>
+            </a:r>
+          </a:p>
+          <a:p>
+            <a:pPr marL="800100" lvl="1" indent="-342900">
+              <a:buFont typeface="Arial" panose="020B0604020202020204" pitchFamily="34" charset="0"/>
+              <a:buChar char="•"/>
+            </a:pPr>
+            <a:r>
+              <a:rPr lang="ko-KR" altLang="en-US"/>
+              <a:t>라이어선정</a:t>
             </a:r>
             <a:endParaRPr lang="en-US" altLang="ko-KR"/>
           </a:p>
           <a:p>
-            <a:pPr marL="800100" lvl="1" indent="-342900">
+            <a:pPr marL="1257300" lvl="2" indent="-342900">
               <a:buAutoNum type="arabicPeriod"/>
             </a:pPr>
             <a:r>
               <a:rPr lang="ko-KR" altLang="en-US"/>
-              <a:t>현재 게임 진행 정보를 갖음</a:t>
+              <a:t>사용자는 라이어선정이 완료될때마다 </a:t>
+            </a:r>
+            <a:r>
+              <a:rPr lang="en-US" altLang="ko-KR"/>
+              <a:t>GameManager</a:t>
+            </a:r>
+            <a:r>
+              <a:rPr lang="ko-KR" altLang="en-US"/>
+              <a:t>에게 알린다</a:t>
+            </a:r>
+            <a:r>
+              <a:rPr lang="en-US" altLang="ko-KR"/>
+              <a:t>.</a:t>
+            </a:r>
+          </a:p>
+          <a:p>
+            <a:pPr marL="800100" lvl="1" indent="-342900">
+              <a:buFont typeface="Arial" panose="020B0604020202020204" pitchFamily="34" charset="0"/>
+              <a:buChar char="•"/>
+            </a:pPr>
+            <a:r>
+              <a:rPr lang="ko-KR" altLang="en-US"/>
+              <a:t>카테고리 제시</a:t>
+            </a:r>
+            <a:r>
+              <a:rPr lang="en-US" altLang="ko-KR"/>
+              <a:t>,</a:t>
+            </a:r>
+            <a:r>
+              <a:rPr lang="ko-KR" altLang="en-US"/>
+              <a:t>키워드 공개</a:t>
             </a:r>
             <a:endParaRPr lang="en-US" altLang="ko-KR"/>
           </a:p>
           <a:p>
-            <a:pPr marL="800100" lvl="1" indent="-342900">
+            <a:pPr marL="1257300" lvl="2" indent="-342900">
               <a:buAutoNum type="arabicPeriod"/>
             </a:pPr>
             <a:r>
               <a:rPr lang="ko-KR" altLang="en-US"/>
-              <a:t>게임 진행단계를 사용자에게 알림</a:t>
+              <a:t>사용자는 키워드를 받으면</a:t>
+            </a:r>
+            <a:r>
+              <a:rPr lang="en-US" altLang="ko-KR"/>
+              <a:t>, GameManager</a:t>
+            </a:r>
+            <a:r>
+              <a:rPr lang="ko-KR" altLang="en-US"/>
+              <a:t>에게 알린다</a:t>
+            </a:r>
+            <a:r>
+              <a:rPr lang="en-US" altLang="ko-KR"/>
+              <a:t>.</a:t>
+            </a:r>
+          </a:p>
+          <a:p>
+            <a:pPr marL="800100" lvl="1" indent="-342900">
+              <a:buFont typeface="Arial" panose="020B0604020202020204" pitchFamily="34" charset="0"/>
+              <a:buChar char="•"/>
+            </a:pPr>
+            <a:r>
+              <a:rPr lang="ko-KR" altLang="en-US"/>
+              <a:t>게임 진행</a:t>
             </a:r>
             <a:endParaRPr lang="en-US" altLang="ko-KR"/>
           </a:p>
           <a:p>
-            <a:pPr marL="342900" indent="-342900">
+            <a:pPr marL="1257300" lvl="2" indent="-342900">
+              <a:buFontTx/>
               <a:buAutoNum type="arabicPeriod"/>
             </a:pPr>
             <a:r>
+              <a:rPr lang="ko-KR" altLang="en-US"/>
+              <a:t>게임 진행단계에서 </a:t>
+            </a:r>
+            <a:r>
               <a:rPr lang="en-US" altLang="ko-KR"/>
-              <a:t>(</a:t>
-            </a:r>
-            <a:r>
-              <a:rPr lang="ko-KR" altLang="en-US"/>
-              <a:t>서버에서 </a:t>
-            </a:r>
-            <a:r>
-              <a:rPr lang="en-US" altLang="ko-KR"/>
-              <a:t>GameManager </a:t>
-            </a:r>
-            <a:r>
-              <a:rPr lang="ko-KR" altLang="en-US"/>
-              <a:t>생성시</a:t>
-            </a:r>
-            <a:r>
-              <a:rPr lang="en-US" altLang="ko-KR"/>
-              <a:t>)GameManager</a:t>
-            </a:r>
-            <a:r>
-              <a:rPr lang="ko-KR" altLang="en-US"/>
-              <a:t>에게 사용자가 들어오고 나가는 것에 대한 응답을 추가적으로 제공한다</a:t>
+              <a:t>RoundController</a:t>
+            </a:r>
+            <a:r>
+              <a:rPr lang="ko-KR" altLang="en-US"/>
+              <a:t>에 게임이 시작되었음을 알린다</a:t>
             </a:r>
             <a:r>
               <a:rPr lang="en-US" altLang="ko-KR"/>
@@ -5736,7 +5748,141 @@
             </a:r>
           </a:p>
           <a:p>
-            <a:pPr marL="342900" indent="-342900">
+            <a:pPr marL="1257300" lvl="2" indent="-342900">
+              <a:buFontTx/>
+              <a:buAutoNum type="arabicPeriod"/>
+            </a:pPr>
+            <a:r>
+              <a:rPr lang="ko-KR" altLang="en-US"/>
+              <a:t>내부적으로 타이머를 돌리며</a:t>
+            </a:r>
+            <a:r>
+              <a:rPr lang="en-US" altLang="ko-KR"/>
+              <a:t>, </a:t>
+            </a:r>
+            <a:r>
+              <a:rPr lang="ko-KR" altLang="en-US"/>
+              <a:t>각 사용자가 대답할 수 있는 시간을 정해두고</a:t>
+            </a:r>
+            <a:r>
+              <a:rPr lang="en-US" altLang="ko-KR"/>
+              <a:t>, </a:t>
+            </a:r>
+            <a:r>
+              <a:rPr lang="ko-KR" altLang="en-US"/>
+              <a:t>타임아웃되면 다음 사용자턴임을 알린다</a:t>
+            </a:r>
+            <a:r>
+              <a:rPr lang="en-US" altLang="ko-KR"/>
+              <a:t>.</a:t>
+            </a:r>
+          </a:p>
+          <a:p>
+            <a:pPr lvl="2"/>
+            <a:endParaRPr lang="en-US" altLang="ko-KR"/>
+          </a:p>
+          <a:p>
+            <a:pPr marL="800100" lvl="1" indent="-342900">
+              <a:buFont typeface="Arial" panose="020B0604020202020204" pitchFamily="34" charset="0"/>
+              <a:buChar char="•"/>
+            </a:pPr>
+            <a:r>
+              <a:rPr lang="ko-KR" altLang="en-US"/>
+              <a:t>라이어 투표</a:t>
+            </a:r>
+            <a:endParaRPr lang="en-US" altLang="ko-KR"/>
+          </a:p>
+          <a:p>
+            <a:pPr marL="1257300" lvl="2" indent="-342900">
+              <a:buFont typeface="Arial" panose="020B0604020202020204" pitchFamily="34" charset="0"/>
+              <a:buChar char="•"/>
+            </a:pPr>
+            <a:r>
+              <a:rPr lang="ko-KR" altLang="en-US"/>
+              <a:t>사용자는 라이어 투표 결과를 </a:t>
+            </a:r>
+            <a:r>
+              <a:rPr lang="en-US" altLang="ko-KR"/>
+              <a:t>GameManager</a:t>
+            </a:r>
+            <a:r>
+              <a:rPr lang="ko-KR" altLang="en-US"/>
+              <a:t>에게 알린다</a:t>
+            </a:r>
+            <a:r>
+              <a:rPr lang="en-US" altLang="ko-KR"/>
+              <a:t>.</a:t>
+            </a:r>
+          </a:p>
+          <a:p>
+            <a:pPr marL="800100" lvl="1" indent="-342900">
+              <a:buFont typeface="Arial" panose="020B0604020202020204" pitchFamily="34" charset="0"/>
+              <a:buChar char="•"/>
+            </a:pPr>
+            <a:r>
+              <a:rPr lang="ko-KR" altLang="en-US"/>
+              <a:t>라이어 공개</a:t>
+            </a:r>
+            <a:endParaRPr lang="en-US" altLang="ko-KR"/>
+          </a:p>
+          <a:p>
+            <a:pPr marL="1257300" lvl="2" indent="-342900">
+              <a:buFont typeface="Arial" panose="020B0604020202020204" pitchFamily="34" charset="0"/>
+              <a:buChar char="•"/>
+            </a:pPr>
+            <a:r>
+              <a:rPr lang="en-US" altLang="ko-KR"/>
+              <a:t>GameManager</a:t>
+            </a:r>
+            <a:r>
+              <a:rPr lang="ko-KR" altLang="en-US"/>
+              <a:t>는 과반수를 체크하여 라이어를 공개시킬지</a:t>
+            </a:r>
+            <a:r>
+              <a:rPr lang="en-US" altLang="ko-KR"/>
+              <a:t>, </a:t>
+            </a:r>
+            <a:r>
+              <a:rPr lang="ko-KR" altLang="en-US"/>
+              <a:t>재투표할지 결정한다</a:t>
+            </a:r>
+            <a:r>
+              <a:rPr lang="en-US" altLang="ko-KR"/>
+              <a:t>.</a:t>
+            </a:r>
+          </a:p>
+          <a:p>
+            <a:pPr marL="800100" lvl="1" indent="-342900">
+              <a:buFont typeface="Arial" panose="020B0604020202020204" pitchFamily="34" charset="0"/>
+              <a:buChar char="•"/>
+            </a:pPr>
+            <a:r>
+              <a:rPr lang="ko-KR" altLang="en-US"/>
+              <a:t>라이어 키워드 맞추기</a:t>
+            </a:r>
+            <a:endParaRPr lang="en-US" altLang="ko-KR"/>
+          </a:p>
+          <a:p>
+            <a:pPr marL="1257300" lvl="2" indent="-342900">
+              <a:buFont typeface="Arial" panose="020B0604020202020204" pitchFamily="34" charset="0"/>
+              <a:buChar char="•"/>
+            </a:pPr>
+            <a:r>
+              <a:rPr lang="en-US" altLang="ko-KR"/>
+              <a:t>GameManager</a:t>
+            </a:r>
+            <a:r>
+              <a:rPr lang="ko-KR" altLang="en-US"/>
+              <a:t>는 라이어에게 키워드를 요청하라고 한다</a:t>
+            </a:r>
+            <a:r>
+              <a:rPr lang="en-US" altLang="ko-KR"/>
+              <a:t>.</a:t>
+            </a:r>
+          </a:p>
+          <a:p>
+            <a:pPr marL="1257300" lvl="2" indent="-342900">
+              <a:buFont typeface="+mj-lt"/>
               <a:buAutoNum type="arabicPeriod"/>
             </a:pPr>
             <a:endParaRPr lang="en-US" altLang="ko-KR"/>
@@ -5746,7 +5892,7 @@
     </p:spTree>
     <p:extLst>
       <p:ext uri="{BB962C8B-B14F-4D97-AF65-F5344CB8AC3E}">
-        <p14:creationId xmlns:p14="http://schemas.microsoft.com/office/powerpoint/2010/main" val="2216331975"/>
+        <p14:creationId xmlns:p14="http://schemas.microsoft.com/office/powerpoint/2010/main" val="894388546"/>
       </p:ext>
     </p:extLst>
   </p:cSld>
@@ -5792,7 +5938,7 @@
         <p:spPr>
           <a:xfrm>
             <a:off x="183858" y="136449"/>
-            <a:ext cx="5319320" cy="582831"/>
+            <a:ext cx="5512267" cy="582831"/>
           </a:xfrm>
         </p:spPr>
         <p:txBody>
@@ -5803,7 +5949,7 @@
           <a:p>
             <a:r>
               <a:rPr lang="en-US" altLang="ko-KR" sz="3200" u="sng"/>
-              <a:t>RoundController</a:t>
+              <a:t>RoomController</a:t>
             </a:r>
             <a:endParaRPr lang="ko-KR" altLang="en-US" sz="3200" u="sng"/>
           </a:p>
@@ -5824,7 +5970,7 @@
         <p:spPr>
           <a:xfrm>
             <a:off x="302004" y="964734"/>
-            <a:ext cx="10377181" cy="6463308"/>
+            <a:ext cx="10377181" cy="2031325"/>
           </a:xfrm>
           <a:prstGeom prst="rect">
             <a:avLst/>
@@ -5841,12 +5987,8 @@
               <a:buAutoNum type="arabicPeriod"/>
             </a:pPr>
             <a:r>
-              <a:rPr lang="en-US" altLang="ko-KR"/>
-              <a:t>http </a:t>
-            </a:r>
-            <a:r>
-              <a:rPr lang="ko-KR" altLang="en-US"/>
-              <a:t>통신</a:t>
+              <a:rPr lang="ko-KR" altLang="en-US"/>
+              <a:t>게임방 관리를 위해 매니저가 필요</a:t>
             </a:r>
             <a:endParaRPr lang="en-US" altLang="ko-KR"/>
           </a:p>
@@ -5856,336 +5998,65 @@
             </a:pPr>
             <a:r>
               <a:rPr lang="ko-KR" altLang="en-US"/>
-              <a:t>라운드 내에서 라운드 진행과정관리</a:t>
+              <a:t>게임 진행에 대한 관리</a:t>
             </a:r>
             <a:endParaRPr lang="en-US" altLang="ko-KR"/>
           </a:p>
           <a:p>
             <a:pPr marL="800100" lvl="1" indent="-342900">
-              <a:buFont typeface="Arial" panose="020B0604020202020204" pitchFamily="34" charset="0"/>
-              <a:buChar char="•"/>
-            </a:pPr>
-            <a:r>
-              <a:rPr lang="ko-KR" altLang="en-US"/>
-              <a:t>게임시작</a:t>
-            </a:r>
-            <a:endParaRPr lang="en-US" altLang="ko-KR"/>
-          </a:p>
-          <a:p>
-            <a:pPr marL="1257300" lvl="2" indent="-342900">
               <a:buAutoNum type="arabicPeriod"/>
             </a:pPr>
             <a:r>
-              <a:rPr lang="en-US" altLang="ko-KR"/>
-              <a:t>GameManager</a:t>
-            </a:r>
-            <a:r>
-              <a:rPr lang="ko-KR" altLang="en-US"/>
-              <a:t>는 룸정보</a:t>
-            </a:r>
-            <a:r>
-              <a:rPr lang="en-US" altLang="ko-KR"/>
-              <a:t>, </a:t>
-            </a:r>
-            <a:r>
-              <a:rPr lang="ko-KR" altLang="en-US"/>
-              <a:t>게임설정 정보를 </a:t>
-            </a:r>
-            <a:r>
-              <a:rPr lang="en-US" altLang="ko-KR"/>
-              <a:t>RoundController</a:t>
-            </a:r>
-            <a:r>
-              <a:rPr lang="ko-KR" altLang="en-US"/>
-              <a:t>에 전달하면</a:t>
-            </a:r>
-            <a:r>
-              <a:rPr lang="en-US" altLang="ko-KR"/>
-              <a:t>,</a:t>
-            </a:r>
-            <a:br>
-              <a:rPr lang="en-US" altLang="ko-KR"/>
-            </a:br>
-            <a:r>
-              <a:rPr lang="en-US" altLang="ko-KR"/>
-              <a:t>RoundController</a:t>
-            </a:r>
-            <a:r>
-              <a:rPr lang="ko-KR" altLang="en-US"/>
-              <a:t>는 라이어게임 설명하는 사용자 순서를 보낸다</a:t>
-            </a:r>
-            <a:r>
-              <a:rPr lang="en-US" altLang="ko-KR"/>
-              <a:t>.</a:t>
-            </a:r>
+              <a:rPr lang="ko-KR" altLang="en-US"/>
+              <a:t>현재 게임 진행 정보를 갖음</a:t>
+            </a:r>
+            <a:endParaRPr lang="en-US" altLang="ko-KR"/>
           </a:p>
           <a:p>
             <a:pPr marL="800100" lvl="1" indent="-342900">
-              <a:buFont typeface="Arial" panose="020B0604020202020204" pitchFamily="34" charset="0"/>
-              <a:buChar char="•"/>
-            </a:pPr>
-            <a:r>
-              <a:rPr lang="ko-KR" altLang="en-US"/>
-              <a:t>라이어선정</a:t>
-            </a:r>
-            <a:endParaRPr lang="en-US" altLang="ko-KR"/>
-          </a:p>
-          <a:p>
-            <a:pPr marL="1257300" lvl="2" indent="-342900">
               <a:buAutoNum type="arabicPeriod"/>
             </a:pPr>
             <a:r>
               <a:rPr lang="ko-KR" altLang="en-US"/>
-              <a:t>각 사용자가 라이어 선정을 요청하면</a:t>
-            </a:r>
-            <a:r>
-              <a:rPr lang="en-US" altLang="ko-KR"/>
-              <a:t>,</a:t>
-            </a:r>
-            <a:r>
-              <a:rPr lang="ko-KR" altLang="en-US"/>
-              <a:t> 사용자에게 라이어 유무를 응답한다</a:t>
-            </a:r>
-            <a:r>
-              <a:rPr lang="en-US" altLang="ko-KR"/>
-              <a:t>.</a:t>
-            </a:r>
-          </a:p>
-          <a:p>
-            <a:pPr marL="1257300" lvl="2" indent="-342900">
-              <a:buAutoNum type="arabicPeriod"/>
-            </a:pPr>
-            <a:r>
-              <a:rPr lang="ko-KR" altLang="en-US"/>
-              <a:t>사용자는 라이어선정이 완료될때마다 </a:t>
-            </a:r>
-            <a:r>
-              <a:rPr lang="en-US" altLang="ko-KR"/>
-              <a:t>GameManager</a:t>
-            </a:r>
-            <a:r>
-              <a:rPr lang="ko-KR" altLang="en-US"/>
-              <a:t>에게 알린다</a:t>
-            </a:r>
-            <a:r>
-              <a:rPr lang="en-US" altLang="ko-KR"/>
-              <a:t>.</a:t>
-            </a:r>
-          </a:p>
-          <a:p>
-            <a:pPr marL="800100" lvl="1" indent="-342900">
-              <a:buFont typeface="Arial" panose="020B0604020202020204" pitchFamily="34" charset="0"/>
-              <a:buChar char="•"/>
-            </a:pPr>
-            <a:r>
-              <a:rPr lang="ko-KR" altLang="en-US"/>
-              <a:t>카테고리 제시</a:t>
-            </a:r>
-            <a:r>
-              <a:rPr lang="en-US" altLang="ko-KR"/>
-              <a:t>,</a:t>
-            </a:r>
-            <a:r>
-              <a:rPr lang="ko-KR" altLang="en-US"/>
-              <a:t>키워드 공개</a:t>
+              <a:t>게임 진행단계를 사용자에게 알림</a:t>
             </a:r>
             <a:endParaRPr lang="en-US" altLang="ko-KR"/>
-          </a:p>
-          <a:p>
-            <a:pPr marL="1257300" lvl="2" indent="-342900">
-              <a:buAutoNum type="arabicPeriod"/>
-            </a:pPr>
-            <a:r>
-              <a:rPr lang="ko-KR" altLang="en-US"/>
-              <a:t>각 사용자가 키워드를 요청하면</a:t>
-            </a:r>
-            <a:r>
-              <a:rPr lang="en-US" altLang="ko-KR"/>
-              <a:t>, </a:t>
-            </a:r>
-            <a:r>
-              <a:rPr lang="ko-KR" altLang="en-US"/>
-              <a:t>방장이 설정한 카테고리중 하나를 선택하고</a:t>
-            </a:r>
-            <a:r>
-              <a:rPr lang="en-US" altLang="ko-KR"/>
-              <a:t> </a:t>
-            </a:r>
-            <a:r>
-              <a:rPr lang="ko-KR" altLang="en-US"/>
-              <a:t>키워드를 응답한다</a:t>
-            </a:r>
-            <a:r>
-              <a:rPr lang="en-US" altLang="ko-KR"/>
-              <a:t>.</a:t>
-            </a:r>
-          </a:p>
-          <a:p>
-            <a:pPr marL="1257300" lvl="2" indent="-342900">
-              <a:buAutoNum type="arabicPeriod"/>
-            </a:pPr>
-            <a:r>
-              <a:rPr lang="ko-KR" altLang="en-US"/>
-              <a:t>사용자는 키워드를 받으면</a:t>
-            </a:r>
-            <a:r>
-              <a:rPr lang="en-US" altLang="ko-KR"/>
-              <a:t>, GameManager</a:t>
-            </a:r>
-            <a:r>
-              <a:rPr lang="ko-KR" altLang="en-US"/>
-              <a:t>에게 알린다</a:t>
-            </a:r>
-            <a:r>
-              <a:rPr lang="en-US" altLang="ko-KR"/>
-              <a:t>.</a:t>
-            </a:r>
-          </a:p>
-          <a:p>
-            <a:pPr marL="800100" lvl="1" indent="-342900">
-              <a:buFont typeface="Arial" panose="020B0604020202020204" pitchFamily="34" charset="0"/>
-              <a:buChar char="•"/>
-            </a:pPr>
-            <a:r>
-              <a:rPr lang="ko-KR" altLang="en-US"/>
-              <a:t>게임 진행</a:t>
-            </a:r>
-            <a:endParaRPr lang="en-US" altLang="ko-KR"/>
-          </a:p>
-          <a:p>
-            <a:pPr marL="1257300" lvl="2" indent="-342900">
-              <a:buAutoNum type="arabicPeriod"/>
-            </a:pPr>
-            <a:r>
-              <a:rPr lang="en-US" altLang="ko-KR"/>
-              <a:t>GameManager</a:t>
-            </a:r>
-            <a:r>
-              <a:rPr lang="ko-KR" altLang="en-US"/>
-              <a:t>는 게임이 진행중임을 서버에 알린다</a:t>
-            </a:r>
-            <a:r>
-              <a:rPr lang="en-US" altLang="ko-KR"/>
-              <a:t>.</a:t>
-            </a:r>
-          </a:p>
-          <a:p>
-            <a:pPr marL="800100" lvl="1" indent="-342900">
-              <a:buFont typeface="Arial" panose="020B0604020202020204" pitchFamily="34" charset="0"/>
-              <a:buChar char="•"/>
-            </a:pPr>
-            <a:r>
-              <a:rPr lang="ko-KR" altLang="en-US"/>
-              <a:t>라이어 투표</a:t>
-            </a:r>
-            <a:endParaRPr lang="en-US" altLang="ko-KR"/>
-          </a:p>
-          <a:p>
-            <a:pPr marL="1257300" lvl="2" indent="-342900">
-              <a:buFont typeface="Arial" panose="020B0604020202020204" pitchFamily="34" charset="0"/>
-              <a:buChar char="•"/>
-            </a:pPr>
-            <a:r>
-              <a:rPr lang="ko-KR" altLang="en-US"/>
-              <a:t>각 사용자는 자신이 생각하는 라이어를 서버에 알린다</a:t>
-            </a:r>
-            <a:r>
-              <a:rPr lang="en-US" altLang="ko-KR"/>
-              <a:t>.</a:t>
-            </a:r>
-          </a:p>
-          <a:p>
-            <a:pPr marL="800100" lvl="1" indent="-342900">
-              <a:buFont typeface="Arial" panose="020B0604020202020204" pitchFamily="34" charset="0"/>
-              <a:buChar char="•"/>
-            </a:pPr>
-            <a:r>
-              <a:rPr lang="ko-KR" altLang="en-US"/>
-              <a:t>라이어 공개</a:t>
-            </a:r>
-            <a:endParaRPr lang="en-US" altLang="ko-KR"/>
-          </a:p>
-          <a:p>
-            <a:pPr marL="1257300" lvl="2" indent="-342900">
-              <a:buFont typeface="Arial" panose="020B0604020202020204" pitchFamily="34" charset="0"/>
-              <a:buChar char="•"/>
-            </a:pPr>
-            <a:r>
-              <a:rPr lang="en-US" altLang="ko-KR"/>
-              <a:t>GameManager</a:t>
-            </a:r>
-            <a:r>
-              <a:rPr lang="ko-KR" altLang="en-US"/>
-              <a:t>가 라이어 공개해달라고 요청하면 결과를 리턴한다</a:t>
-            </a:r>
-            <a:r>
-              <a:rPr lang="en-US" altLang="ko-KR"/>
-              <a:t>.</a:t>
-            </a:r>
-          </a:p>
-          <a:p>
-            <a:pPr marL="800100" lvl="1" indent="-342900">
-              <a:buFont typeface="Arial" panose="020B0604020202020204" pitchFamily="34" charset="0"/>
-              <a:buChar char="•"/>
-            </a:pPr>
-            <a:r>
-              <a:rPr lang="ko-KR" altLang="en-US"/>
-              <a:t>라이어 키워드 맞추기</a:t>
-            </a:r>
-            <a:endParaRPr lang="en-US" altLang="ko-KR"/>
-          </a:p>
-          <a:p>
-            <a:pPr marL="1257300" lvl="2" indent="-342900">
-              <a:buFont typeface="Arial" panose="020B0604020202020204" pitchFamily="34" charset="0"/>
-              <a:buChar char="•"/>
-            </a:pPr>
-            <a:r>
-              <a:rPr lang="ko-KR" altLang="en-US"/>
-              <a:t>라이어는 키워드를 던지고</a:t>
-            </a:r>
-            <a:r>
-              <a:rPr lang="en-US" altLang="ko-KR"/>
-              <a:t>, </a:t>
-            </a:r>
-            <a:r>
-              <a:rPr lang="ko-KR" altLang="en-US"/>
-              <a:t>정답여부를 서버에서 받는다</a:t>
-            </a:r>
-            <a:r>
-              <a:rPr lang="en-US" altLang="ko-KR"/>
-              <a:t>.</a:t>
-            </a:r>
-          </a:p>
-          <a:p>
-            <a:pPr marL="1257300" lvl="2" indent="-342900">
-              <a:buFont typeface="Arial" panose="020B0604020202020204" pitchFamily="34" charset="0"/>
-              <a:buChar char="•"/>
-            </a:pPr>
-            <a:r>
-              <a:rPr lang="ko-KR" altLang="en-US"/>
-              <a:t>그리고 사용자는 </a:t>
-            </a:r>
-            <a:r>
-              <a:rPr lang="en-US" altLang="ko-KR"/>
-              <a:t>GameManager</a:t>
-            </a:r>
-            <a:r>
-              <a:rPr lang="ko-KR" altLang="en-US"/>
-              <a:t>에 알린다</a:t>
-            </a:r>
-            <a:r>
-              <a:rPr lang="en-US" altLang="ko-KR"/>
-              <a:t>.</a:t>
-            </a:r>
           </a:p>
           <a:p>
             <a:pPr marL="342900" indent="-342900">
               <a:buAutoNum type="arabicPeriod"/>
             </a:pPr>
-            <a:endParaRPr lang="en-US" altLang="ko-KR"/>
-          </a:p>
-          <a:p>
-            <a:pPr marL="800100" lvl="1" indent="-342900">
+            <a:r>
+              <a:rPr lang="en-US" altLang="ko-KR"/>
+              <a:t>(</a:t>
+            </a:r>
+            <a:r>
+              <a:rPr lang="ko-KR" altLang="en-US"/>
+              <a:t>서버에서 </a:t>
+            </a:r>
+            <a:r>
+              <a:rPr lang="en-US" altLang="ko-KR"/>
+              <a:t>GameManager </a:t>
+            </a:r>
+            <a:r>
+              <a:rPr lang="ko-KR" altLang="en-US"/>
+              <a:t>생성시</a:t>
+            </a:r>
+            <a:r>
+              <a:rPr lang="en-US" altLang="ko-KR"/>
+              <a:t>)GameManager</a:t>
+            </a:r>
+            <a:r>
+              <a:rPr lang="ko-KR" altLang="en-US"/>
+              <a:t>에게 사용자가 들어오고 나가는 것에 대한 응답을 추가적으로 제공한다</a:t>
+            </a:r>
+            <a:r>
+              <a:rPr lang="en-US" altLang="ko-KR"/>
+              <a:t>.</a:t>
+            </a:r>
+          </a:p>
+          <a:p>
+            <a:pPr marL="342900" indent="-342900">
               <a:buAutoNum type="arabicPeriod"/>
             </a:pPr>
             <a:endParaRPr lang="en-US" altLang="ko-KR"/>
@@ -6195,7 +6066,7 @@
     </p:spTree>
     <p:extLst>
       <p:ext uri="{BB962C8B-B14F-4D97-AF65-F5344CB8AC3E}">
-        <p14:creationId xmlns:p14="http://schemas.microsoft.com/office/powerpoint/2010/main" val="166265996"/>
+        <p14:creationId xmlns:p14="http://schemas.microsoft.com/office/powerpoint/2010/main" val="2216331975"/>
       </p:ext>
     </p:extLst>
   </p:cSld>
@@ -6241,7 +6112,7 @@
         <p:spPr>
           <a:xfrm>
             <a:off x="183858" y="136449"/>
-            <a:ext cx="3012347" cy="582831"/>
+            <a:ext cx="5319320" cy="582831"/>
           </a:xfrm>
         </p:spPr>
         <p:txBody>
@@ -6251,9 +6122,10 @@
           <a:lstStyle/>
           <a:p>
             <a:r>
-              <a:rPr lang="ko-KR" altLang="en-US" sz="3200"/>
-              <a:t>제약사항</a:t>
-            </a:r>
+              <a:rPr lang="en-US" altLang="ko-KR" sz="3200" u="sng"/>
+              <a:t>RoundController</a:t>
+            </a:r>
+            <a:endParaRPr lang="ko-KR" altLang="en-US" sz="3200" u="sng"/>
           </a:p>
         </p:txBody>
       </p:sp>
@@ -6272,7 +6144,7 @@
         <p:spPr>
           <a:xfrm>
             <a:off x="302004" y="964734"/>
-            <a:ext cx="10377181" cy="646331"/>
+            <a:ext cx="10377181" cy="6463308"/>
           </a:xfrm>
           <a:prstGeom prst="rect">
             <a:avLst/>
@@ -6289,13 +6161,351 @@
               <a:buAutoNum type="arabicPeriod"/>
             </a:pPr>
             <a:r>
-              <a:rPr lang="ko-KR" altLang="en-US"/>
-              <a:t>크롬만 지원</a:t>
+              <a:rPr lang="en-US" altLang="ko-KR"/>
+              <a:t>http </a:t>
+            </a:r>
+            <a:r>
+              <a:rPr lang="ko-KR" altLang="en-US"/>
+              <a:t>통신</a:t>
             </a:r>
             <a:endParaRPr lang="en-US" altLang="ko-KR"/>
           </a:p>
           <a:p>
             <a:pPr marL="342900" indent="-342900">
+              <a:buAutoNum type="arabicPeriod"/>
+            </a:pPr>
+            <a:r>
+              <a:rPr lang="ko-KR" altLang="en-US"/>
+              <a:t>라운드 내에서 라운드 진행과정관리</a:t>
+            </a:r>
+            <a:endParaRPr lang="en-US" altLang="ko-KR"/>
+          </a:p>
+          <a:p>
+            <a:pPr marL="800100" lvl="1" indent="-342900">
+              <a:buFont typeface="Arial" panose="020B0604020202020204" pitchFamily="34" charset="0"/>
+              <a:buChar char="•"/>
+            </a:pPr>
+            <a:r>
+              <a:rPr lang="ko-KR" altLang="en-US"/>
+              <a:t>게임시작</a:t>
+            </a:r>
+            <a:endParaRPr lang="en-US" altLang="ko-KR"/>
+          </a:p>
+          <a:p>
+            <a:pPr marL="1257300" lvl="2" indent="-342900">
+              <a:buAutoNum type="arabicPeriod"/>
+            </a:pPr>
+            <a:r>
+              <a:rPr lang="en-US" altLang="ko-KR"/>
+              <a:t>GameManager</a:t>
+            </a:r>
+            <a:r>
+              <a:rPr lang="ko-KR" altLang="en-US"/>
+              <a:t>는 룸정보</a:t>
+            </a:r>
+            <a:r>
+              <a:rPr lang="en-US" altLang="ko-KR"/>
+              <a:t>, </a:t>
+            </a:r>
+            <a:r>
+              <a:rPr lang="ko-KR" altLang="en-US"/>
+              <a:t>게임설정 정보를 </a:t>
+            </a:r>
+            <a:r>
+              <a:rPr lang="en-US" altLang="ko-KR"/>
+              <a:t>RoundController</a:t>
+            </a:r>
+            <a:r>
+              <a:rPr lang="ko-KR" altLang="en-US"/>
+              <a:t>에 전달하면</a:t>
+            </a:r>
+            <a:r>
+              <a:rPr lang="en-US" altLang="ko-KR"/>
+              <a:t>,</a:t>
+            </a:r>
+            <a:br>
+              <a:rPr lang="en-US" altLang="ko-KR"/>
+            </a:br>
+            <a:r>
+              <a:rPr lang="en-US" altLang="ko-KR"/>
+              <a:t>RoundController</a:t>
+            </a:r>
+            <a:r>
+              <a:rPr lang="ko-KR" altLang="en-US"/>
+              <a:t>는 라이어게임 설명하는 사용자 순서를 보낸다</a:t>
+            </a:r>
+            <a:r>
+              <a:rPr lang="en-US" altLang="ko-KR"/>
+              <a:t>.</a:t>
+            </a:r>
+          </a:p>
+          <a:p>
+            <a:pPr marL="800100" lvl="1" indent="-342900">
+              <a:buFont typeface="Arial" panose="020B0604020202020204" pitchFamily="34" charset="0"/>
+              <a:buChar char="•"/>
+            </a:pPr>
+            <a:r>
+              <a:rPr lang="ko-KR" altLang="en-US"/>
+              <a:t>라이어선정</a:t>
+            </a:r>
+            <a:endParaRPr lang="en-US" altLang="ko-KR"/>
+          </a:p>
+          <a:p>
+            <a:pPr marL="1257300" lvl="2" indent="-342900">
+              <a:buAutoNum type="arabicPeriod"/>
+            </a:pPr>
+            <a:r>
+              <a:rPr lang="ko-KR" altLang="en-US"/>
+              <a:t>각 사용자가 라이어 선정을 요청하면</a:t>
+            </a:r>
+            <a:r>
+              <a:rPr lang="en-US" altLang="ko-KR"/>
+              <a:t>,</a:t>
+            </a:r>
+            <a:r>
+              <a:rPr lang="ko-KR" altLang="en-US"/>
+              <a:t> 사용자에게 라이어 유무를 응답한다</a:t>
+            </a:r>
+            <a:r>
+              <a:rPr lang="en-US" altLang="ko-KR"/>
+              <a:t>.</a:t>
+            </a:r>
+          </a:p>
+          <a:p>
+            <a:pPr marL="1257300" lvl="2" indent="-342900">
+              <a:buAutoNum type="arabicPeriod"/>
+            </a:pPr>
+            <a:r>
+              <a:rPr lang="ko-KR" altLang="en-US"/>
+              <a:t>사용자는 라이어선정이 완료될때마다 </a:t>
+            </a:r>
+            <a:r>
+              <a:rPr lang="en-US" altLang="ko-KR"/>
+              <a:t>GameManager</a:t>
+            </a:r>
+            <a:r>
+              <a:rPr lang="ko-KR" altLang="en-US"/>
+              <a:t>에게 알린다</a:t>
+            </a:r>
+            <a:r>
+              <a:rPr lang="en-US" altLang="ko-KR"/>
+              <a:t>.</a:t>
+            </a:r>
+          </a:p>
+          <a:p>
+            <a:pPr marL="800100" lvl="1" indent="-342900">
+              <a:buFont typeface="Arial" panose="020B0604020202020204" pitchFamily="34" charset="0"/>
+              <a:buChar char="•"/>
+            </a:pPr>
+            <a:r>
+              <a:rPr lang="ko-KR" altLang="en-US"/>
+              <a:t>카테고리 제시</a:t>
+            </a:r>
+            <a:r>
+              <a:rPr lang="en-US" altLang="ko-KR"/>
+              <a:t>,</a:t>
+            </a:r>
+            <a:r>
+              <a:rPr lang="ko-KR" altLang="en-US"/>
+              <a:t>키워드 공개</a:t>
+            </a:r>
+            <a:endParaRPr lang="en-US" altLang="ko-KR"/>
+          </a:p>
+          <a:p>
+            <a:pPr marL="1257300" lvl="2" indent="-342900">
+              <a:buAutoNum type="arabicPeriod"/>
+            </a:pPr>
+            <a:r>
+              <a:rPr lang="ko-KR" altLang="en-US"/>
+              <a:t>각 사용자가 키워드를 요청하면</a:t>
+            </a:r>
+            <a:r>
+              <a:rPr lang="en-US" altLang="ko-KR"/>
+              <a:t>, </a:t>
+            </a:r>
+            <a:r>
+              <a:rPr lang="ko-KR" altLang="en-US"/>
+              <a:t>방장이 설정한 카테고리중 하나를 선택하고</a:t>
+            </a:r>
+            <a:r>
+              <a:rPr lang="en-US" altLang="ko-KR"/>
+              <a:t> </a:t>
+            </a:r>
+            <a:r>
+              <a:rPr lang="ko-KR" altLang="en-US"/>
+              <a:t>키워드를 응답한다</a:t>
+            </a:r>
+            <a:r>
+              <a:rPr lang="en-US" altLang="ko-KR"/>
+              <a:t>.</a:t>
+            </a:r>
+          </a:p>
+          <a:p>
+            <a:pPr marL="1257300" lvl="2" indent="-342900">
+              <a:buAutoNum type="arabicPeriod"/>
+            </a:pPr>
+            <a:r>
+              <a:rPr lang="ko-KR" altLang="en-US"/>
+              <a:t>사용자는 키워드를 받으면</a:t>
+            </a:r>
+            <a:r>
+              <a:rPr lang="en-US" altLang="ko-KR"/>
+              <a:t>, GameManager</a:t>
+            </a:r>
+            <a:r>
+              <a:rPr lang="ko-KR" altLang="en-US"/>
+              <a:t>에게 알린다</a:t>
+            </a:r>
+            <a:r>
+              <a:rPr lang="en-US" altLang="ko-KR"/>
+              <a:t>.</a:t>
+            </a:r>
+          </a:p>
+          <a:p>
+            <a:pPr marL="800100" lvl="1" indent="-342900">
+              <a:buFont typeface="Arial" panose="020B0604020202020204" pitchFamily="34" charset="0"/>
+              <a:buChar char="•"/>
+            </a:pPr>
+            <a:r>
+              <a:rPr lang="ko-KR" altLang="en-US"/>
+              <a:t>게임 진행</a:t>
+            </a:r>
+            <a:endParaRPr lang="en-US" altLang="ko-KR"/>
+          </a:p>
+          <a:p>
+            <a:pPr marL="1257300" lvl="2" indent="-342900">
+              <a:buAutoNum type="arabicPeriod"/>
+            </a:pPr>
+            <a:r>
+              <a:rPr lang="en-US" altLang="ko-KR"/>
+              <a:t>GameManager</a:t>
+            </a:r>
+            <a:r>
+              <a:rPr lang="ko-KR" altLang="en-US"/>
+              <a:t>는 게임이 진행중임을 서버에 알린다</a:t>
+            </a:r>
+            <a:r>
+              <a:rPr lang="en-US" altLang="ko-KR"/>
+              <a:t>.</a:t>
+            </a:r>
+          </a:p>
+          <a:p>
+            <a:pPr marL="800100" lvl="1" indent="-342900">
+              <a:buFont typeface="Arial" panose="020B0604020202020204" pitchFamily="34" charset="0"/>
+              <a:buChar char="•"/>
+            </a:pPr>
+            <a:r>
+              <a:rPr lang="ko-KR" altLang="en-US"/>
+              <a:t>라이어 투표</a:t>
+            </a:r>
+            <a:endParaRPr lang="en-US" altLang="ko-KR"/>
+          </a:p>
+          <a:p>
+            <a:pPr marL="1257300" lvl="2" indent="-342900">
+              <a:buFont typeface="Arial" panose="020B0604020202020204" pitchFamily="34" charset="0"/>
+              <a:buChar char="•"/>
+            </a:pPr>
+            <a:r>
+              <a:rPr lang="ko-KR" altLang="en-US"/>
+              <a:t>각 사용자는 자신이 생각하는 라이어를 서버에 알린다</a:t>
+            </a:r>
+            <a:r>
+              <a:rPr lang="en-US" altLang="ko-KR"/>
+              <a:t>.</a:t>
+            </a:r>
+          </a:p>
+          <a:p>
+            <a:pPr marL="800100" lvl="1" indent="-342900">
+              <a:buFont typeface="Arial" panose="020B0604020202020204" pitchFamily="34" charset="0"/>
+              <a:buChar char="•"/>
+            </a:pPr>
+            <a:r>
+              <a:rPr lang="ko-KR" altLang="en-US"/>
+              <a:t>라이어 공개</a:t>
+            </a:r>
+            <a:endParaRPr lang="en-US" altLang="ko-KR"/>
+          </a:p>
+          <a:p>
+            <a:pPr marL="1257300" lvl="2" indent="-342900">
+              <a:buFont typeface="Arial" panose="020B0604020202020204" pitchFamily="34" charset="0"/>
+              <a:buChar char="•"/>
+            </a:pPr>
+            <a:r>
+              <a:rPr lang="en-US" altLang="ko-KR"/>
+              <a:t>GameManager</a:t>
+            </a:r>
+            <a:r>
+              <a:rPr lang="ko-KR" altLang="en-US"/>
+              <a:t>가 라이어 공개해달라고 요청하면 결과를 리턴한다</a:t>
+            </a:r>
+            <a:r>
+              <a:rPr lang="en-US" altLang="ko-KR"/>
+              <a:t>.</a:t>
+            </a:r>
+          </a:p>
+          <a:p>
+            <a:pPr marL="800100" lvl="1" indent="-342900">
+              <a:buFont typeface="Arial" panose="020B0604020202020204" pitchFamily="34" charset="0"/>
+              <a:buChar char="•"/>
+            </a:pPr>
+            <a:r>
+              <a:rPr lang="ko-KR" altLang="en-US"/>
+              <a:t>라이어 키워드 맞추기</a:t>
+            </a:r>
+            <a:endParaRPr lang="en-US" altLang="ko-KR"/>
+          </a:p>
+          <a:p>
+            <a:pPr marL="1257300" lvl="2" indent="-342900">
+              <a:buFont typeface="Arial" panose="020B0604020202020204" pitchFamily="34" charset="0"/>
+              <a:buChar char="•"/>
+            </a:pPr>
+            <a:r>
+              <a:rPr lang="ko-KR" altLang="en-US"/>
+              <a:t>라이어는 키워드를 던지고</a:t>
+            </a:r>
+            <a:r>
+              <a:rPr lang="en-US" altLang="ko-KR"/>
+              <a:t>, </a:t>
+            </a:r>
+            <a:r>
+              <a:rPr lang="ko-KR" altLang="en-US"/>
+              <a:t>정답여부를 서버에서 받는다</a:t>
+            </a:r>
+            <a:r>
+              <a:rPr lang="en-US" altLang="ko-KR"/>
+              <a:t>.</a:t>
+            </a:r>
+          </a:p>
+          <a:p>
+            <a:pPr marL="1257300" lvl="2" indent="-342900">
+              <a:buFont typeface="Arial" panose="020B0604020202020204" pitchFamily="34" charset="0"/>
+              <a:buChar char="•"/>
+            </a:pPr>
+            <a:r>
+              <a:rPr lang="ko-KR" altLang="en-US"/>
+              <a:t>그리고 사용자는 </a:t>
+            </a:r>
+            <a:r>
+              <a:rPr lang="en-US" altLang="ko-KR"/>
+              <a:t>GameManager</a:t>
+            </a:r>
+            <a:r>
+              <a:rPr lang="ko-KR" altLang="en-US"/>
+              <a:t>에 알린다</a:t>
+            </a:r>
+            <a:r>
+              <a:rPr lang="en-US" altLang="ko-KR"/>
+              <a:t>.</a:t>
+            </a:r>
+          </a:p>
+          <a:p>
+            <a:pPr marL="342900" indent="-342900">
+              <a:buAutoNum type="arabicPeriod"/>
+            </a:pPr>
+            <a:endParaRPr lang="en-US" altLang="ko-KR"/>
+          </a:p>
+          <a:p>
+            <a:pPr marL="800100" lvl="1" indent="-342900">
               <a:buAutoNum type="arabicPeriod"/>
             </a:pPr>
             <a:endParaRPr lang="en-US" altLang="ko-KR"/>
@@ -6305,7 +6515,7 @@
     </p:spTree>
     <p:extLst>
       <p:ext uri="{BB962C8B-B14F-4D97-AF65-F5344CB8AC3E}">
-        <p14:creationId xmlns:p14="http://schemas.microsoft.com/office/powerpoint/2010/main" val="201518751"/>
+        <p14:creationId xmlns:p14="http://schemas.microsoft.com/office/powerpoint/2010/main" val="166265996"/>
       </p:ext>
     </p:extLst>
   </p:cSld>
@@ -6362,7 +6572,7 @@
           <a:p>
             <a:r>
               <a:rPr lang="ko-KR" altLang="en-US" sz="3200"/>
-              <a:t>추가할 점</a:t>
+              <a:t>제약사항</a:t>
             </a:r>
           </a:p>
         </p:txBody>
@@ -6381,8 +6591,8 @@
         </p:nvSpPr>
         <p:spPr>
           <a:xfrm>
-            <a:off x="276837" y="998290"/>
-            <a:ext cx="10377181" cy="1200329"/>
+            <a:off x="302004" y="964734"/>
+            <a:ext cx="10377181" cy="646331"/>
           </a:xfrm>
           <a:prstGeom prst="rect">
             <a:avLst/>
@@ -6395,6 +6605,116 @@
           </a:bodyPr>
           <a:lstStyle/>
           <a:p>
+            <a:pPr marL="342900" indent="-342900">
+              <a:buAutoNum type="arabicPeriod"/>
+            </a:pPr>
+            <a:r>
+              <a:rPr lang="ko-KR" altLang="en-US"/>
+              <a:t>크롬만 지원</a:t>
+            </a:r>
+            <a:endParaRPr lang="en-US" altLang="ko-KR"/>
+          </a:p>
+          <a:p>
+            <a:pPr marL="342900" indent="-342900">
+              <a:buAutoNum type="arabicPeriod"/>
+            </a:pPr>
+            <a:endParaRPr lang="en-US" altLang="ko-KR"/>
+          </a:p>
+        </p:txBody>
+      </p:sp>
+    </p:spTree>
+    <p:extLst>
+      <p:ext uri="{BB962C8B-B14F-4D97-AF65-F5344CB8AC3E}">
+        <p14:creationId xmlns:p14="http://schemas.microsoft.com/office/powerpoint/2010/main" val="201518751"/>
+      </p:ext>
+    </p:extLst>
+  </p:cSld>
+  <p:clrMapOvr>
+    <a:masterClrMapping/>
+  </p:clrMapOvr>
+</p:sld>
+</file>
+
+<file path=ppt/slides/slide17.xml><?xml version="1.0" encoding="utf-8"?>
+<p:sld xmlns:a="http://schemas.openxmlformats.org/drawingml/2006/main" xmlns:r="http://schemas.openxmlformats.org/officeDocument/2006/relationships" xmlns:p="http://schemas.openxmlformats.org/presentationml/2006/main">
+  <p:cSld>
+    <p:spTree>
+      <p:nvGrpSpPr>
+        <p:cNvPr id="1" name=""/>
+        <p:cNvGrpSpPr/>
+        <p:nvPr/>
+      </p:nvGrpSpPr>
+      <p:grpSpPr>
+        <a:xfrm>
+          <a:off x="0" y="0"/>
+          <a:ext cx="0" cy="0"/>
+          <a:chOff x="0" y="0"/>
+          <a:chExt cx="0" cy="0"/>
+        </a:xfrm>
+      </p:grpSpPr>
+      <p:sp>
+        <p:nvSpPr>
+          <p:cNvPr id="5" name="제목 4">
+            <a:extLst>
+              <a:ext uri="{FF2B5EF4-FFF2-40B4-BE49-F238E27FC236}">
+                <a16:creationId xmlns:a16="http://schemas.microsoft.com/office/drawing/2014/main" id="{5C35C333-91A6-C986-A543-E94154679624}"/>
+              </a:ext>
+            </a:extLst>
+          </p:cNvPr>
+          <p:cNvSpPr>
+            <a:spLocks noGrp="1"/>
+          </p:cNvSpPr>
+          <p:nvPr>
+            <p:ph type="title"/>
+          </p:nvPr>
+        </p:nvSpPr>
+        <p:spPr>
+          <a:xfrm>
+            <a:off x="183858" y="136449"/>
+            <a:ext cx="3012347" cy="582831"/>
+          </a:xfrm>
+        </p:spPr>
+        <p:txBody>
+          <a:bodyPr>
+            <a:noAutofit/>
+          </a:bodyPr>
+          <a:lstStyle/>
+          <a:p>
+            <a:r>
+              <a:rPr lang="ko-KR" altLang="en-US" sz="3200"/>
+              <a:t>추가할 점</a:t>
+            </a:r>
+          </a:p>
+        </p:txBody>
+      </p:sp>
+      <p:sp>
+        <p:nvSpPr>
+          <p:cNvPr id="2" name="TextBox 1">
+            <a:extLst>
+              <a:ext uri="{FF2B5EF4-FFF2-40B4-BE49-F238E27FC236}">
+                <a16:creationId xmlns:a16="http://schemas.microsoft.com/office/drawing/2014/main" id="{10644CBD-FE2C-6596-D141-E729B130417F}"/>
+              </a:ext>
+            </a:extLst>
+          </p:cNvPr>
+          <p:cNvSpPr txBox="1"/>
+          <p:nvPr/>
+        </p:nvSpPr>
+        <p:spPr>
+          <a:xfrm>
+            <a:off x="276837" y="998290"/>
+            <a:ext cx="10377181" cy="1477328"/>
+          </a:xfrm>
+          <a:prstGeom prst="rect">
+            <a:avLst/>
+          </a:prstGeom>
+          <a:noFill/>
+        </p:spPr>
+        <p:txBody>
+          <a:bodyPr wrap="square" rtlCol="0">
+            <a:spAutoFit/>
+          </a:bodyPr>
+          <a:lstStyle/>
+          <a:p>
             <a:pPr marL="285750" indent="-285750">
               <a:buFont typeface="Arial" panose="020B0604020202020204" pitchFamily="34" charset="0"/>
               <a:buChar char="•"/>
@@ -6442,6 +6762,17 @@
             <a:r>
               <a:rPr lang="ko-KR" altLang="en-US"/>
               <a:t>클라이언트 상에서 게임처럼 이동할 수 있도록</a:t>
+            </a:r>
+            <a:endParaRPr lang="en-US" altLang="ko-KR"/>
+          </a:p>
+          <a:p>
+            <a:pPr marL="285750" indent="-285750">
+              <a:buFont typeface="Arial" panose="020B0604020202020204" pitchFamily="34" charset="0"/>
+              <a:buChar char="•"/>
+            </a:pPr>
+            <a:r>
+              <a:rPr lang="ko-KR" altLang="en-US"/>
+              <a:t>소켓 연결 인원조절</a:t>
             </a:r>
             <a:endParaRPr lang="en-US" altLang="ko-KR"/>
           </a:p>

</xml_diff>